<commit_message>
clean up semantics dir
</commit_message>
<xml_diff>
--- a/assets/ppt/codegen/runtime.pptx
+++ b/assets/ppt/codegen/runtime.pptx
@@ -39,25 +39,25 @@
     <p:sldId id="301" r:id="rId27"/>
     <p:sldId id="324" r:id="rId28"/>
     <p:sldId id="303" r:id="rId29"/>
-    <p:sldId id="312" r:id="rId30"/>
-    <p:sldId id="320" r:id="rId31"/>
-    <p:sldId id="321" r:id="rId32"/>
-    <p:sldId id="302" r:id="rId33"/>
-    <p:sldId id="305" r:id="rId34"/>
-    <p:sldId id="304" r:id="rId35"/>
-    <p:sldId id="306" r:id="rId36"/>
-    <p:sldId id="307" r:id="rId37"/>
-    <p:sldId id="308" r:id="rId38"/>
-    <p:sldId id="309" r:id="rId39"/>
-    <p:sldId id="310" r:id="rId40"/>
-    <p:sldId id="313" r:id="rId41"/>
-    <p:sldId id="311" r:id="rId42"/>
-    <p:sldId id="325" r:id="rId43"/>
-    <p:sldId id="265" r:id="rId44"/>
-    <p:sldId id="266" r:id="rId45"/>
-    <p:sldId id="268" r:id="rId46"/>
-    <p:sldId id="276" r:id="rId47"/>
-    <p:sldId id="277" r:id="rId48"/>
+    <p:sldId id="302" r:id="rId30"/>
+    <p:sldId id="305" r:id="rId31"/>
+    <p:sldId id="304" r:id="rId32"/>
+    <p:sldId id="306" r:id="rId33"/>
+    <p:sldId id="307" r:id="rId34"/>
+    <p:sldId id="308" r:id="rId35"/>
+    <p:sldId id="309" r:id="rId36"/>
+    <p:sldId id="310" r:id="rId37"/>
+    <p:sldId id="313" r:id="rId38"/>
+    <p:sldId id="311" r:id="rId39"/>
+    <p:sldId id="325" r:id="rId40"/>
+    <p:sldId id="265" r:id="rId41"/>
+    <p:sldId id="266" r:id="rId42"/>
+    <p:sldId id="268" r:id="rId43"/>
+    <p:sldId id="276" r:id="rId44"/>
+    <p:sldId id="277" r:id="rId45"/>
+    <p:sldId id="312" r:id="rId46"/>
+    <p:sldId id="320" r:id="rId47"/>
+    <p:sldId id="321" r:id="rId48"/>
     <p:sldId id="263" r:id="rId49"/>
     <p:sldId id="270" r:id="rId50"/>
     <p:sldId id="271" r:id="rId51"/>
@@ -867,10 +867,10 @@
           <a:bodyPr/>
           <a:lstStyle/>
           <a:p>
-            <a:fld id="{4B07BCA8-6537-EE45-8E0C-A25AFA752A5D}" type="slidenum">
+            <a:fld id="{75152E34-9F71-A24A-A63B-F745045A75A3}" type="slidenum">
               <a:rPr lang="en-US"/>
               <a:pPr/>
-              <a:t>46</a:t>
+              <a:t>45</a:t>
             </a:fld>
             <a:endParaRPr lang="en-US"/>
           </a:p>
@@ -878,7 +878,7 @@
       </p:sp>
       <p:sp>
         <p:nvSpPr>
-          <p:cNvPr id="113666" name="Rectangle 1026"/>
+          <p:cNvPr id="116738" name="Rectangle 2"/>
           <p:cNvSpPr>
             <a:spLocks noGrp="1" noRot="1" noChangeAspect="1" noChangeArrowheads="1" noTextEdit="1"/>
           </p:cNvSpPr>
@@ -896,7 +896,7 @@
       </p:sp>
       <p:sp>
         <p:nvSpPr>
-          <p:cNvPr id="113667" name="Rectangle 1027"/>
+          <p:cNvPr id="116739" name="Rectangle 3"/>
           <p:cNvSpPr>
             <a:spLocks noGrp="1" noChangeArrowheads="1"/>
           </p:cNvSpPr>
@@ -914,6 +914,11 @@
         </p:txBody>
       </p:sp>
     </p:spTree>
+    <p:extLst>
+      <p:ext uri="{BB962C8B-B14F-4D97-AF65-F5344CB8AC3E}">
+        <p14:creationId xmlns:p14="http://schemas.microsoft.com/office/powerpoint/2010/main" val="3674786799"/>
+      </p:ext>
+    </p:extLst>
   </p:cSld>
   <p:clrMapOvr>
     <a:masterClrMapping/>
@@ -955,7 +960,7 @@
           <a:bodyPr/>
           <a:lstStyle/>
           <a:p>
-            <a:fld id="{8CC7A05C-6192-3E4F-90E2-980AD65153B6}" type="slidenum">
+            <a:fld id="{01653D2B-06D8-964B-AB70-9B86198CE375}" type="slidenum">
               <a:rPr lang="en-US"/>
               <a:pPr/>
               <a:t>47</a:t>
@@ -966,7 +971,7 @@
       </p:sp>
       <p:sp>
         <p:nvSpPr>
-          <p:cNvPr id="114690" name="Rectangle 2"/>
+          <p:cNvPr id="118786" name="Rectangle 2"/>
           <p:cNvSpPr>
             <a:spLocks noGrp="1" noRot="1" noChangeAspect="1" noChangeArrowheads="1" noTextEdit="1"/>
           </p:cNvSpPr>
@@ -984,7 +989,7 @@
       </p:sp>
       <p:sp>
         <p:nvSpPr>
-          <p:cNvPr id="114691" name="Rectangle 3"/>
+          <p:cNvPr id="118787" name="Rectangle 3"/>
           <p:cNvSpPr>
             <a:spLocks noGrp="1" noChangeArrowheads="1"/>
           </p:cNvSpPr>
@@ -1002,6 +1007,11 @@
         </p:txBody>
       </p:sp>
     </p:spTree>
+    <p:extLst>
+      <p:ext uri="{BB962C8B-B14F-4D97-AF65-F5344CB8AC3E}">
+        <p14:creationId xmlns:p14="http://schemas.microsoft.com/office/powerpoint/2010/main" val="762925367"/>
+      </p:ext>
+    </p:extLst>
   </p:cSld>
   <p:clrMapOvr>
     <a:masterClrMapping/>
@@ -1923,10 +1933,10 @@
           <a:bodyPr/>
           <a:lstStyle/>
           <a:p>
-            <a:fld id="{75152E34-9F71-A24A-A63B-F745045A75A3}" type="slidenum">
+            <a:fld id="{67B9E9D3-DEB6-084D-9C05-9773C434B998}" type="slidenum">
               <a:rPr lang="en-US"/>
               <a:pPr/>
-              <a:t>29</a:t>
+              <a:t>38</a:t>
             </a:fld>
             <a:endParaRPr lang="en-US"/>
           </a:p>
@@ -1934,7 +1944,7 @@
       </p:sp>
       <p:sp>
         <p:nvSpPr>
-          <p:cNvPr id="116738" name="Rectangle 2"/>
+          <p:cNvPr id="124930" name="Rectangle 2"/>
           <p:cNvSpPr>
             <a:spLocks noGrp="1" noRot="1" noChangeAspect="1" noChangeArrowheads="1" noTextEdit="1"/>
           </p:cNvSpPr>
@@ -1952,7 +1962,7 @@
       </p:sp>
       <p:sp>
         <p:nvSpPr>
-          <p:cNvPr id="116739" name="Rectangle 3"/>
+          <p:cNvPr id="124931" name="Rectangle 3"/>
           <p:cNvSpPr>
             <a:spLocks noGrp="1" noChangeArrowheads="1"/>
           </p:cNvSpPr>
@@ -2011,10 +2021,10 @@
           <a:bodyPr/>
           <a:lstStyle/>
           <a:p>
-            <a:fld id="{01653D2B-06D8-964B-AB70-9B86198CE375}" type="slidenum">
+            <a:fld id="{0CABE95A-2AF8-1740-987F-6CCF40512845}" type="slidenum">
               <a:rPr lang="en-US"/>
               <a:pPr/>
-              <a:t>31</a:t>
+              <a:t>40</a:t>
             </a:fld>
             <a:endParaRPr lang="en-US"/>
           </a:p>
@@ -2022,7 +2032,7 @@
       </p:sp>
       <p:sp>
         <p:nvSpPr>
-          <p:cNvPr id="118786" name="Rectangle 2"/>
+          <p:cNvPr id="109570" name="Rectangle 2"/>
           <p:cNvSpPr>
             <a:spLocks noGrp="1" noRot="1" noChangeAspect="1" noChangeArrowheads="1" noTextEdit="1"/>
           </p:cNvSpPr>
@@ -2040,7 +2050,7 @@
       </p:sp>
       <p:sp>
         <p:nvSpPr>
-          <p:cNvPr id="118787" name="Rectangle 3"/>
+          <p:cNvPr id="109571" name="Rectangle 3"/>
           <p:cNvSpPr>
             <a:spLocks noGrp="1" noChangeArrowheads="1"/>
           </p:cNvSpPr>
@@ -2099,7 +2109,7 @@
           <a:bodyPr/>
           <a:lstStyle/>
           <a:p>
-            <a:fld id="{67B9E9D3-DEB6-084D-9C05-9773C434B998}" type="slidenum">
+            <a:fld id="{37856DA2-26F4-5E46-88ED-4E3BA7DBF346}" type="slidenum">
               <a:rPr lang="en-US"/>
               <a:pPr/>
               <a:t>41</a:t>
@@ -2110,7 +2120,7 @@
       </p:sp>
       <p:sp>
         <p:nvSpPr>
-          <p:cNvPr id="124930" name="Rectangle 2"/>
+          <p:cNvPr id="110594" name="Rectangle 1026"/>
           <p:cNvSpPr>
             <a:spLocks noGrp="1" noRot="1" noChangeAspect="1" noChangeArrowheads="1" noTextEdit="1"/>
           </p:cNvSpPr>
@@ -2128,7 +2138,7 @@
       </p:sp>
       <p:sp>
         <p:nvSpPr>
-          <p:cNvPr id="124931" name="Rectangle 3"/>
+          <p:cNvPr id="110595" name="Rectangle 1027"/>
           <p:cNvSpPr>
             <a:spLocks noGrp="1" noChangeArrowheads="1"/>
           </p:cNvSpPr>
@@ -2187,10 +2197,10 @@
           <a:bodyPr/>
           <a:lstStyle/>
           <a:p>
-            <a:fld id="{0CABE95A-2AF8-1740-987F-6CCF40512845}" type="slidenum">
+            <a:fld id="{66B4587A-2E87-154D-A63F-3983C66572FC}" type="slidenum">
               <a:rPr lang="en-US"/>
               <a:pPr/>
-              <a:t>43</a:t>
+              <a:t>42</a:t>
             </a:fld>
             <a:endParaRPr lang="en-US"/>
           </a:p>
@@ -2198,7 +2208,7 @@
       </p:sp>
       <p:sp>
         <p:nvSpPr>
-          <p:cNvPr id="109570" name="Rectangle 2"/>
+          <p:cNvPr id="111618" name="Rectangle 2"/>
           <p:cNvSpPr>
             <a:spLocks noGrp="1" noRot="1" noChangeAspect="1" noChangeArrowheads="1" noTextEdit="1"/>
           </p:cNvSpPr>
@@ -2216,7 +2226,7 @@
       </p:sp>
       <p:sp>
         <p:nvSpPr>
-          <p:cNvPr id="109571" name="Rectangle 3"/>
+          <p:cNvPr id="111619" name="Rectangle 3"/>
           <p:cNvSpPr>
             <a:spLocks noGrp="1" noChangeArrowheads="1"/>
           </p:cNvSpPr>
@@ -2275,10 +2285,10 @@
           <a:bodyPr/>
           <a:lstStyle/>
           <a:p>
-            <a:fld id="{37856DA2-26F4-5E46-88ED-4E3BA7DBF346}" type="slidenum">
+            <a:fld id="{4B07BCA8-6537-EE45-8E0C-A25AFA752A5D}" type="slidenum">
               <a:rPr lang="en-US"/>
               <a:pPr/>
-              <a:t>44</a:t>
+              <a:t>43</a:t>
             </a:fld>
             <a:endParaRPr lang="en-US"/>
           </a:p>
@@ -2286,7 +2296,7 @@
       </p:sp>
       <p:sp>
         <p:nvSpPr>
-          <p:cNvPr id="110594" name="Rectangle 1026"/>
+          <p:cNvPr id="113666" name="Rectangle 1026"/>
           <p:cNvSpPr>
             <a:spLocks noGrp="1" noRot="1" noChangeAspect="1" noChangeArrowheads="1" noTextEdit="1"/>
           </p:cNvSpPr>
@@ -2304,7 +2314,7 @@
       </p:sp>
       <p:sp>
         <p:nvSpPr>
-          <p:cNvPr id="110595" name="Rectangle 1027"/>
+          <p:cNvPr id="113667" name="Rectangle 1027"/>
           <p:cNvSpPr>
             <a:spLocks noGrp="1" noChangeArrowheads="1"/>
           </p:cNvSpPr>
@@ -2363,10 +2373,10 @@
           <a:bodyPr/>
           <a:lstStyle/>
           <a:p>
-            <a:fld id="{66B4587A-2E87-154D-A63F-3983C66572FC}" type="slidenum">
+            <a:fld id="{8CC7A05C-6192-3E4F-90E2-980AD65153B6}" type="slidenum">
               <a:rPr lang="en-US"/>
               <a:pPr/>
-              <a:t>45</a:t>
+              <a:t>44</a:t>
             </a:fld>
             <a:endParaRPr lang="en-US"/>
           </a:p>
@@ -2374,7 +2384,7 @@
       </p:sp>
       <p:sp>
         <p:nvSpPr>
-          <p:cNvPr id="111618" name="Rectangle 2"/>
+          <p:cNvPr id="114690" name="Rectangle 2"/>
           <p:cNvSpPr>
             <a:spLocks noGrp="1" noRot="1" noChangeAspect="1" noChangeArrowheads="1" noTextEdit="1"/>
           </p:cNvSpPr>
@@ -2392,7 +2402,7 @@
       </p:sp>
       <p:sp>
         <p:nvSpPr>
-          <p:cNvPr id="111619" name="Rectangle 3"/>
+          <p:cNvPr id="114691" name="Rectangle 3"/>
           <p:cNvSpPr>
             <a:spLocks noGrp="1" noChangeArrowheads="1"/>
           </p:cNvSpPr>
@@ -25252,15 +25262,7 @@
           <a:p>
             <a:r>
               <a:rPr lang="en-CA" sz="2100" dirty="0"/>
-              <a:t>There is </a:t>
-            </a:r>
-            <a:r>
-              <a:rPr lang="en-CA" sz="2100"/>
-              <a:t>nothing special </a:t>
-            </a:r>
-            <a:r>
-              <a:rPr lang="en-CA" sz="2100" dirty="0"/>
-              <a:t>about this organization</a:t>
+              <a:t>There is nothing special about this organization</a:t>
             </a:r>
           </a:p>
           <a:p>
@@ -25473,9 +25475,9 @@
       </p:grpSpPr>
       <p:sp>
         <p:nvSpPr>
-          <p:cNvPr id="87042" name="Rectangle 2"/>
+          <p:cNvPr id="2" name="Title 1"/>
           <p:cNvSpPr>
-            <a:spLocks noGrp="1" noChangeArrowheads="1"/>
+            <a:spLocks noGrp="1"/>
           </p:cNvSpPr>
           <p:nvPr>
             <p:ph type="title"/>
@@ -25487,8 +25489,68 @@
           <a:lstStyle/>
           <a:p>
             <a:r>
-              <a:rPr lang="en-US" dirty="0"/>
-              <a:t>MIPS Stack frame</a:t>
+              <a:rPr lang="en-CA" dirty="0"/>
+              <a:t>Global Variables</a:t>
+            </a:r>
+          </a:p>
+        </p:txBody>
+      </p:sp>
+      <p:sp>
+        <p:nvSpPr>
+          <p:cNvPr id="3" name="Content Placeholder 2"/>
+          <p:cNvSpPr>
+            <a:spLocks noGrp="1"/>
+          </p:cNvSpPr>
+          <p:nvPr>
+            <p:ph idx="1"/>
+          </p:nvPr>
+        </p:nvSpPr>
+        <p:spPr/>
+        <p:txBody>
+          <a:bodyPr/>
+          <a:lstStyle/>
+          <a:p>
+            <a:r>
+              <a:rPr lang="en-CA" dirty="0"/>
+              <a:t>All references to a global variable point to the same object</a:t>
+            </a:r>
+          </a:p>
+          <a:p>
+            <a:pPr lvl="1"/>
+            <a:r>
+              <a:rPr lang="en-CA" dirty="0">
+                <a:solidFill>
+                  <a:schemeClr val="accent2"/>
+                </a:solidFill>
+              </a:rPr>
+              <a:t>Cannot store a global in an activation record</a:t>
+            </a:r>
+          </a:p>
+          <a:p>
+            <a:r>
+              <a:rPr lang="en-CA" dirty="0" err="1"/>
+              <a:t>Globals</a:t>
+            </a:r>
+            <a:r>
+              <a:rPr lang="en-CA" dirty="0"/>
+              <a:t> are assigned a fixed address once </a:t>
+            </a:r>
+          </a:p>
+          <a:p>
+            <a:pPr lvl="1"/>
+            <a:r>
+              <a:rPr lang="en-CA" dirty="0">
+                <a:solidFill>
+                  <a:schemeClr val="accent2"/>
+                </a:solidFill>
+              </a:rPr>
+              <a:t>Variables with fixed address are “statically allocated”</a:t>
+            </a:r>
+          </a:p>
+          <a:p>
+            <a:r>
+              <a:rPr lang="en-CA" dirty="0"/>
+              <a:t>Depending on the language, there may be other statically allocated values</a:t>
             </a:r>
           </a:p>
         </p:txBody>
@@ -25508,1435 +25570,10 @@
           <a:bodyPr/>
           <a:lstStyle/>
           <a:p>
-            <a:fld id="{8A393549-EAF5-6541-9573-246DD75762A5}" type="slidenum">
-              <a:rPr lang="en-US"/>
-              <a:pPr/>
-              <a:t>29</a:t>
-            </a:fld>
-            <a:endParaRPr lang="en-US"/>
-          </a:p>
-        </p:txBody>
-      </p:sp>
-      <p:pic>
-        <p:nvPicPr>
-          <p:cNvPr id="87044" name="Picture 4"/>
-          <p:cNvPicPr>
-            <a:picLocks noChangeAspect="1" noChangeArrowheads="1"/>
-          </p:cNvPicPr>
-          <p:nvPr/>
-        </p:nvPicPr>
-        <p:blipFill>
-          <a:blip r:embed="rId3"/>
-          <a:srcRect/>
-          <a:stretch>
-            <a:fillRect/>
-          </a:stretch>
-        </p:blipFill>
-        <p:spPr bwMode="auto">
-          <a:xfrm>
-            <a:off x="2171700" y="1143000"/>
-            <a:ext cx="4972050" cy="3873104"/>
-          </a:xfrm>
-          <a:prstGeom prst="rect">
-            <a:avLst/>
-          </a:prstGeom>
-          <a:noFill/>
-          <a:ln w="9525">
-            <a:noFill/>
-            <a:miter lim="800000"/>
-            <a:headEnd/>
-            <a:tailEnd/>
-          </a:ln>
-          <a:effectLst/>
-        </p:spPr>
-      </p:pic>
-      <p:sp>
-        <p:nvSpPr>
-          <p:cNvPr id="6" name="Rounded Rectangular Callout 5"/>
-          <p:cNvSpPr/>
-          <p:nvPr/>
-        </p:nvSpPr>
-        <p:spPr bwMode="auto">
-          <a:xfrm>
-            <a:off x="1314450" y="1657350"/>
-            <a:ext cx="1485900" cy="457200"/>
-          </a:xfrm>
-          <a:prstGeom prst="wedgeRoundRectCallout">
-            <a:avLst>
-              <a:gd name="adj1" fmla="val 28965"/>
-              <a:gd name="adj2" fmla="val 69220"/>
-              <a:gd name="adj3" fmla="val 16667"/>
-            </a:avLst>
-          </a:prstGeom>
-          <a:solidFill>
-            <a:schemeClr val="accent5">
-              <a:lumMod val="40000"/>
-              <a:lumOff val="60000"/>
-            </a:schemeClr>
-          </a:solidFill>
-          <a:ln w="9525" cap="flat" cmpd="sng" algn="ctr">
-            <a:solidFill>
-              <a:schemeClr val="tx1"/>
-            </a:solidFill>
-            <a:prstDash val="solid"/>
-            <a:round/>
-            <a:headEnd type="none" w="med" len="med"/>
-            <a:tailEnd type="none" w="med" len="med"/>
-          </a:ln>
-          <a:effectLst/>
-        </p:spPr>
-        <p:txBody>
-          <a:bodyPr vert="horz" wrap="square" lIns="68580" tIns="34290" rIns="68580" bIns="34290" numCol="1" rtlCol="0" anchor="t" anchorCtr="0" compatLnSpc="1">
-            <a:prstTxWarp prst="textNoShape">
-              <a:avLst/>
-            </a:prstTxWarp>
-            <a:normAutofit fontScale="92500"/>
-          </a:bodyPr>
-          <a:lstStyle/>
-          <a:p>
-            <a:pPr defTabSz="685800"/>
-            <a:r>
-              <a:rPr lang="en-US" sz="1800" dirty="0">
-                <a:latin typeface="Calibri" panose="020F0502020204030204" pitchFamily="34" charset="0"/>
-              </a:rPr>
-              <a:t>Frame pointer</a:t>
-            </a:r>
-          </a:p>
-        </p:txBody>
-      </p:sp>
-      <p:sp>
-        <p:nvSpPr>
-          <p:cNvPr id="7" name="Rounded Rectangular Callout 6"/>
-          <p:cNvSpPr/>
-          <p:nvPr/>
-        </p:nvSpPr>
-        <p:spPr bwMode="auto">
-          <a:xfrm>
-            <a:off x="1314450" y="4114800"/>
-            <a:ext cx="1485900" cy="457200"/>
-          </a:xfrm>
-          <a:prstGeom prst="wedgeRoundRectCallout">
-            <a:avLst>
-              <a:gd name="adj1" fmla="val 28965"/>
-              <a:gd name="adj2" fmla="val 69220"/>
-              <a:gd name="adj3" fmla="val 16667"/>
-            </a:avLst>
-          </a:prstGeom>
-          <a:solidFill>
-            <a:schemeClr val="accent5">
-              <a:lumMod val="40000"/>
-              <a:lumOff val="60000"/>
-            </a:schemeClr>
-          </a:solidFill>
-          <a:ln w="9525" cap="flat" cmpd="sng" algn="ctr">
-            <a:solidFill>
-              <a:schemeClr val="tx1"/>
-            </a:solidFill>
-            <a:prstDash val="solid"/>
-            <a:round/>
-            <a:headEnd type="none" w="med" len="med"/>
-            <a:tailEnd type="none" w="med" len="med"/>
-          </a:ln>
-          <a:effectLst/>
-        </p:spPr>
-        <p:txBody>
-          <a:bodyPr vert="horz" wrap="square" lIns="68580" tIns="34290" rIns="68580" bIns="34290" numCol="1" rtlCol="0" anchor="t" anchorCtr="0" compatLnSpc="1">
-            <a:prstTxWarp prst="textNoShape">
-              <a:avLst/>
-            </a:prstTxWarp>
-            <a:normAutofit/>
-          </a:bodyPr>
-          <a:lstStyle/>
-          <a:p>
-            <a:pPr defTabSz="685800"/>
-            <a:r>
-              <a:rPr lang="en-US" sz="1800" dirty="0">
-                <a:latin typeface="Calibri" panose="020F0502020204030204" pitchFamily="34" charset="0"/>
-              </a:rPr>
-              <a:t>Stack pointer</a:t>
-            </a:r>
-          </a:p>
-        </p:txBody>
-      </p:sp>
-      <p:sp>
-        <p:nvSpPr>
-          <p:cNvPr id="8" name="Rounded Rectangular Callout 7"/>
-          <p:cNvSpPr/>
-          <p:nvPr/>
-        </p:nvSpPr>
-        <p:spPr bwMode="auto">
-          <a:xfrm>
-            <a:off x="5143500" y="1761660"/>
-            <a:ext cx="2514600" cy="1314450"/>
-          </a:xfrm>
-          <a:prstGeom prst="wedgeRoundRectCallout">
-            <a:avLst>
-              <a:gd name="adj1" fmla="val -61567"/>
-              <a:gd name="adj2" fmla="val -20174"/>
-              <a:gd name="adj3" fmla="val 16667"/>
-            </a:avLst>
-          </a:prstGeom>
-          <a:solidFill>
-            <a:schemeClr val="accent5">
-              <a:lumMod val="40000"/>
-              <a:lumOff val="60000"/>
-            </a:schemeClr>
-          </a:solidFill>
-          <a:ln w="9525" cap="flat" cmpd="sng" algn="ctr">
-            <a:solidFill>
-              <a:schemeClr val="tx1"/>
-            </a:solidFill>
-            <a:prstDash val="solid"/>
-            <a:round/>
-            <a:headEnd type="none" w="med" len="med"/>
-            <a:tailEnd type="none" w="med" len="med"/>
-          </a:ln>
-          <a:effectLst/>
-        </p:spPr>
-        <p:txBody>
-          <a:bodyPr vert="horz" wrap="square" lIns="68580" tIns="34290" rIns="68580" bIns="34290" numCol="1" rtlCol="0" anchor="t" anchorCtr="0" compatLnSpc="1">
-            <a:prstTxWarp prst="textNoShape">
-              <a:avLst/>
-            </a:prstTxWarp>
-            <a:normAutofit/>
-          </a:bodyPr>
-          <a:lstStyle/>
-          <a:p>
-            <a:pPr defTabSz="685800"/>
-            <a:r>
-              <a:rPr lang="en-US" sz="1800" dirty="0">
-                <a:latin typeface="Calibri" panose="020F0502020204030204" pitchFamily="34" charset="0"/>
-              </a:rPr>
-              <a:t>In MIPS, Argument 1-4 are provided to the function in registers $a0-$a3</a:t>
-            </a:r>
-          </a:p>
-        </p:txBody>
-      </p:sp>
-      <p:sp>
-        <p:nvSpPr>
-          <p:cNvPr id="9" name="Rounded Rectangular Callout 8"/>
-          <p:cNvSpPr/>
-          <p:nvPr/>
-        </p:nvSpPr>
-        <p:spPr bwMode="auto">
-          <a:xfrm>
-            <a:off x="5926956" y="3597865"/>
-            <a:ext cx="1615375" cy="594065"/>
-          </a:xfrm>
-          <a:prstGeom prst="wedgeRoundRectCallout">
-            <a:avLst>
-              <a:gd name="adj1" fmla="val -62230"/>
-              <a:gd name="adj2" fmla="val -56250"/>
-              <a:gd name="adj3" fmla="val 16667"/>
-            </a:avLst>
-          </a:prstGeom>
-          <a:solidFill>
-            <a:schemeClr val="accent5">
-              <a:lumMod val="40000"/>
-              <a:lumOff val="60000"/>
-            </a:schemeClr>
-          </a:solidFill>
-          <a:ln w="9525" cap="flat" cmpd="sng" algn="ctr">
-            <a:solidFill>
-              <a:schemeClr val="tx1"/>
-            </a:solidFill>
-            <a:prstDash val="solid"/>
-            <a:round/>
-            <a:headEnd type="none" w="med" len="med"/>
-            <a:tailEnd type="none" w="med" len="med"/>
-          </a:ln>
-          <a:effectLst/>
-        </p:spPr>
-        <p:txBody>
-          <a:bodyPr vert="horz" wrap="square" lIns="68580" tIns="34290" rIns="68580" bIns="34290" numCol="1" rtlCol="0" anchor="t" anchorCtr="0" compatLnSpc="1">
-            <a:prstTxWarp prst="textNoShape">
-              <a:avLst/>
-            </a:prstTxWarp>
-            <a:normAutofit fontScale="92500" lnSpcReduction="10000"/>
-          </a:bodyPr>
-          <a:lstStyle/>
-          <a:p>
-            <a:pPr defTabSz="685800"/>
-            <a:r>
-              <a:rPr lang="en-US" sz="1800" dirty="0">
-                <a:latin typeface="Calibri" panose="020F0502020204030204" pitchFamily="34" charset="0"/>
-              </a:rPr>
-              <a:t>Return address in $</a:t>
-            </a:r>
-            <a:r>
-              <a:rPr lang="en-US" sz="1800" dirty="0" err="1">
-                <a:latin typeface="Calibri" panose="020F0502020204030204" pitchFamily="34" charset="0"/>
-              </a:rPr>
-              <a:t>ra</a:t>
-            </a:r>
-            <a:endParaRPr lang="en-US" sz="1800" dirty="0">
-              <a:latin typeface="Calibri" panose="020F0502020204030204" pitchFamily="34" charset="0"/>
-            </a:endParaRPr>
-          </a:p>
-        </p:txBody>
-      </p:sp>
-    </p:spTree>
-    <p:extLst>
-      <p:ext uri="{BB962C8B-B14F-4D97-AF65-F5344CB8AC3E}">
-        <p14:creationId xmlns:p14="http://schemas.microsoft.com/office/powerpoint/2010/main" val="109741862"/>
-      </p:ext>
-    </p:extLst>
-  </p:cSld>
-  <p:clrMapOvr>
-    <a:masterClrMapping/>
-  </p:clrMapOvr>
-  <p:timing>
-    <p:tnLst>
-      <p:par>
-        <p:cTn id="1" dur="indefinite" restart="never" nodeType="tmRoot">
-          <p:childTnLst>
-            <p:seq concurrent="1" nextAc="seek">
-              <p:cTn id="2" dur="indefinite" nodeType="mainSeq">
-                <p:childTnLst>
-                  <p:par>
-                    <p:cTn id="3" fill="hold">
-                      <p:stCondLst>
-                        <p:cond delay="indefinite"/>
-                      </p:stCondLst>
-                      <p:childTnLst>
-                        <p:par>
-                          <p:cTn id="4" fill="hold">
-                            <p:stCondLst>
-                              <p:cond delay="0"/>
-                            </p:stCondLst>
-                            <p:childTnLst>
-                              <p:par>
-                                <p:cTn id="5" presetID="1" presetClass="entr" presetSubtype="0" fill="hold" grpId="0" nodeType="clickEffect">
-                                  <p:stCondLst>
-                                    <p:cond delay="0"/>
-                                  </p:stCondLst>
-                                  <p:childTnLst>
-                                    <p:set>
-                                      <p:cBhvr>
-                                        <p:cTn id="6" dur="1" fill="hold">
-                                          <p:stCondLst>
-                                            <p:cond delay="0"/>
-                                          </p:stCondLst>
-                                        </p:cTn>
-                                        <p:tgtEl>
-                                          <p:spTgt spid="6"/>
-                                        </p:tgtEl>
-                                        <p:attrNameLst>
-                                          <p:attrName>style.visibility</p:attrName>
-                                        </p:attrNameLst>
-                                      </p:cBhvr>
-                                      <p:to>
-                                        <p:strVal val="visible"/>
-                                      </p:to>
-                                    </p:set>
-                                  </p:childTnLst>
-                                </p:cTn>
-                              </p:par>
-                            </p:childTnLst>
-                          </p:cTn>
-                        </p:par>
-                      </p:childTnLst>
-                    </p:cTn>
-                  </p:par>
-                  <p:par>
-                    <p:cTn id="7" fill="hold">
-                      <p:stCondLst>
-                        <p:cond delay="indefinite"/>
-                      </p:stCondLst>
-                      <p:childTnLst>
-                        <p:par>
-                          <p:cTn id="8" fill="hold">
-                            <p:stCondLst>
-                              <p:cond delay="0"/>
-                            </p:stCondLst>
-                            <p:childTnLst>
-                              <p:par>
-                                <p:cTn id="9" presetID="1" presetClass="entr" presetSubtype="0" fill="hold" grpId="0" nodeType="clickEffect">
-                                  <p:stCondLst>
-                                    <p:cond delay="0"/>
-                                  </p:stCondLst>
-                                  <p:childTnLst>
-                                    <p:set>
-                                      <p:cBhvr>
-                                        <p:cTn id="10" dur="1" fill="hold">
-                                          <p:stCondLst>
-                                            <p:cond delay="0"/>
-                                          </p:stCondLst>
-                                        </p:cTn>
-                                        <p:tgtEl>
-                                          <p:spTgt spid="7"/>
-                                        </p:tgtEl>
-                                        <p:attrNameLst>
-                                          <p:attrName>style.visibility</p:attrName>
-                                        </p:attrNameLst>
-                                      </p:cBhvr>
-                                      <p:to>
-                                        <p:strVal val="visible"/>
-                                      </p:to>
-                                    </p:set>
-                                  </p:childTnLst>
-                                </p:cTn>
-                              </p:par>
-                            </p:childTnLst>
-                          </p:cTn>
-                        </p:par>
-                      </p:childTnLst>
-                    </p:cTn>
-                  </p:par>
-                  <p:par>
-                    <p:cTn id="11" fill="hold">
-                      <p:stCondLst>
-                        <p:cond delay="indefinite"/>
-                      </p:stCondLst>
-                      <p:childTnLst>
-                        <p:par>
-                          <p:cTn id="12" fill="hold">
-                            <p:stCondLst>
-                              <p:cond delay="0"/>
-                            </p:stCondLst>
-                            <p:childTnLst>
-                              <p:par>
-                                <p:cTn id="13" presetID="1" presetClass="entr" presetSubtype="0" fill="hold" grpId="0" nodeType="clickEffect">
-                                  <p:stCondLst>
-                                    <p:cond delay="0"/>
-                                  </p:stCondLst>
-                                  <p:childTnLst>
-                                    <p:set>
-                                      <p:cBhvr>
-                                        <p:cTn id="14" dur="1" fill="hold">
-                                          <p:stCondLst>
-                                            <p:cond delay="0"/>
-                                          </p:stCondLst>
-                                        </p:cTn>
-                                        <p:tgtEl>
-                                          <p:spTgt spid="8"/>
-                                        </p:tgtEl>
-                                        <p:attrNameLst>
-                                          <p:attrName>style.visibility</p:attrName>
-                                        </p:attrNameLst>
-                                      </p:cBhvr>
-                                      <p:to>
-                                        <p:strVal val="visible"/>
-                                      </p:to>
-                                    </p:set>
-                                  </p:childTnLst>
-                                </p:cTn>
-                              </p:par>
-                            </p:childTnLst>
-                          </p:cTn>
-                        </p:par>
-                      </p:childTnLst>
-                    </p:cTn>
-                  </p:par>
-                  <p:par>
-                    <p:cTn id="15" fill="hold">
-                      <p:stCondLst>
-                        <p:cond delay="indefinite"/>
-                      </p:stCondLst>
-                      <p:childTnLst>
-                        <p:par>
-                          <p:cTn id="16" fill="hold">
-                            <p:stCondLst>
-                              <p:cond delay="0"/>
-                            </p:stCondLst>
-                            <p:childTnLst>
-                              <p:par>
-                                <p:cTn id="17" presetID="1" presetClass="entr" presetSubtype="0" fill="hold" grpId="0" nodeType="clickEffect">
-                                  <p:stCondLst>
-                                    <p:cond delay="0"/>
-                                  </p:stCondLst>
-                                  <p:childTnLst>
-                                    <p:set>
-                                      <p:cBhvr>
-                                        <p:cTn id="18" dur="1" fill="hold">
-                                          <p:stCondLst>
-                                            <p:cond delay="0"/>
-                                          </p:stCondLst>
-                                        </p:cTn>
-                                        <p:tgtEl>
-                                          <p:spTgt spid="9"/>
-                                        </p:tgtEl>
-                                        <p:attrNameLst>
-                                          <p:attrName>style.visibility</p:attrName>
-                                        </p:attrNameLst>
-                                      </p:cBhvr>
-                                      <p:to>
-                                        <p:strVal val="visible"/>
-                                      </p:to>
-                                    </p:set>
-                                  </p:childTnLst>
-                                </p:cTn>
-                              </p:par>
-                            </p:childTnLst>
-                          </p:cTn>
-                        </p:par>
-                      </p:childTnLst>
-                    </p:cTn>
-                  </p:par>
-                </p:childTnLst>
-              </p:cTn>
-              <p:prevCondLst>
-                <p:cond evt="onPrev" delay="0">
-                  <p:tgtEl>
-                    <p:sldTgt/>
-                  </p:tgtEl>
-                </p:cond>
-              </p:prevCondLst>
-              <p:nextCondLst>
-                <p:cond evt="onNext" delay="0">
-                  <p:tgtEl>
-                    <p:sldTgt/>
-                  </p:tgtEl>
-                </p:cond>
-              </p:nextCondLst>
-            </p:seq>
-          </p:childTnLst>
-        </p:cTn>
-      </p:par>
-    </p:tnLst>
-    <p:bldLst>
-      <p:bldP spid="6" grpId="0" animBg="1"/>
-      <p:bldP spid="7" grpId="0" animBg="1"/>
-      <p:bldP spid="8" grpId="0" animBg="1"/>
-      <p:bldP spid="9" grpId="0" animBg="1"/>
-    </p:bldLst>
-  </p:timing>
-</p:sld>
-</file>
-
-<file path=ppt/slides/slide3.xml><?xml version="1.0" encoding="utf-8"?>
-<p:sld xmlns:a="http://schemas.openxmlformats.org/drawingml/2006/main" xmlns:r="http://schemas.openxmlformats.org/officeDocument/2006/relationships" xmlns:p="http://schemas.openxmlformats.org/presentationml/2006/main">
-  <p:cSld>
-    <p:spTree>
-      <p:nvGrpSpPr>
-        <p:cNvPr id="1" name=""/>
-        <p:cNvGrpSpPr/>
-        <p:nvPr/>
-      </p:nvGrpSpPr>
-      <p:grpSpPr>
-        <a:xfrm>
-          <a:off x="0" y="0"/>
-          <a:ext cx="0" cy="0"/>
-          <a:chOff x="0" y="0"/>
-          <a:chExt cx="0" cy="0"/>
-        </a:xfrm>
-      </p:grpSpPr>
-      <p:sp>
-        <p:nvSpPr>
-          <p:cNvPr id="2" name="Title 1"/>
-          <p:cNvSpPr>
-            <a:spLocks noGrp="1"/>
-          </p:cNvSpPr>
-          <p:nvPr>
-            <p:ph type="title"/>
-          </p:nvPr>
-        </p:nvSpPr>
-        <p:spPr/>
-        <p:txBody>
-          <a:bodyPr/>
-          <a:lstStyle/>
-          <a:p>
-            <a:r>
-              <a:rPr lang="en-CA" dirty="0"/>
-              <a:t>Invoke the Program</a:t>
-            </a:r>
-          </a:p>
-        </p:txBody>
-      </p:sp>
-      <p:sp>
-        <p:nvSpPr>
-          <p:cNvPr id="3" name="Content Placeholder 2"/>
-          <p:cNvSpPr>
-            <a:spLocks noGrp="1"/>
-          </p:cNvSpPr>
-          <p:nvPr>
-            <p:ph idx="1"/>
-          </p:nvPr>
-        </p:nvSpPr>
-        <p:spPr/>
-        <p:txBody>
-          <a:bodyPr/>
-          <a:lstStyle/>
-          <a:p>
-            <a:r>
-              <a:rPr lang="en-CA" dirty="0"/>
-              <a:t>Execution of the program is initially under the control of the operating system</a:t>
-            </a:r>
-          </a:p>
-          <a:p>
-            <a:r>
-              <a:rPr lang="en-CA" dirty="0"/>
-              <a:t>When program is invoked:</a:t>
-            </a:r>
-          </a:p>
-          <a:p>
-            <a:pPr lvl="1"/>
-            <a:r>
-              <a:rPr lang="en-CA" dirty="0"/>
-              <a:t>The OS allocates space for the program</a:t>
-            </a:r>
-          </a:p>
-          <a:p>
-            <a:pPr lvl="1"/>
-            <a:r>
-              <a:rPr lang="en-CA" dirty="0"/>
-              <a:t>The code is loaded into part of the memory</a:t>
-            </a:r>
-          </a:p>
-          <a:p>
-            <a:pPr lvl="1"/>
-            <a:r>
-              <a:rPr lang="en-CA" dirty="0"/>
-              <a:t>The OS jumps to the entry point (i.e., main)</a:t>
-            </a:r>
-          </a:p>
-        </p:txBody>
-      </p:sp>
-      <p:sp>
-        <p:nvSpPr>
-          <p:cNvPr id="5" name="Slide Number Placeholder 4"/>
-          <p:cNvSpPr>
-            <a:spLocks noGrp="1"/>
-          </p:cNvSpPr>
-          <p:nvPr>
-            <p:ph type="sldNum" sz="quarter" idx="12"/>
-          </p:nvPr>
-        </p:nvSpPr>
-        <p:spPr/>
-        <p:txBody>
-          <a:bodyPr/>
-          <a:lstStyle/>
-          <a:p>
             <a:fld id="{EFA508D8-6740-FE46-95CC-F1012A7A27C5}" type="slidenum">
               <a:rPr lang="en-US" smtClean="0"/>
               <a:pPr/>
-              <a:t>3</a:t>
-            </a:fld>
-            <a:endParaRPr lang="en-US"/>
-          </a:p>
-        </p:txBody>
-      </p:sp>
-    </p:spTree>
-    <p:extLst>
-      <p:ext uri="{BB962C8B-B14F-4D97-AF65-F5344CB8AC3E}">
-        <p14:creationId xmlns:p14="http://schemas.microsoft.com/office/powerpoint/2010/main" val="3676250933"/>
-      </p:ext>
-    </p:extLst>
-  </p:cSld>
-  <p:clrMapOvr>
-    <a:masterClrMapping/>
-  </p:clrMapOvr>
-</p:sld>
-</file>
-
-<file path=ppt/slides/slide30.xml><?xml version="1.0" encoding="utf-8"?>
-<p:sld xmlns:a="http://schemas.openxmlformats.org/drawingml/2006/main" xmlns:r="http://schemas.openxmlformats.org/officeDocument/2006/relationships" xmlns:p="http://schemas.openxmlformats.org/presentationml/2006/main">
-  <p:cSld>
-    <p:spTree>
-      <p:nvGrpSpPr>
-        <p:cNvPr id="1" name=""/>
-        <p:cNvGrpSpPr/>
-        <p:nvPr/>
-      </p:nvGrpSpPr>
-      <p:grpSpPr>
-        <a:xfrm>
-          <a:off x="0" y="0"/>
-          <a:ext cx="0" cy="0"/>
-          <a:chOff x="0" y="0"/>
-          <a:chExt cx="0" cy="0"/>
-        </a:xfrm>
-      </p:grpSpPr>
-      <p:sp>
-        <p:nvSpPr>
-          <p:cNvPr id="4" name="Slide Number Placeholder 3"/>
-          <p:cNvSpPr>
-            <a:spLocks noGrp="1"/>
-          </p:cNvSpPr>
-          <p:nvPr>
-            <p:ph type="sldNum" sz="quarter" idx="12"/>
-          </p:nvPr>
-        </p:nvSpPr>
-        <p:spPr/>
-        <p:txBody>
-          <a:bodyPr/>
-          <a:lstStyle/>
-          <a:p>
-            <a:fld id="{60E1BFF4-DB76-D940-A65B-72E1BC4F90EC}" type="slidenum">
-              <a:rPr lang="en-US" smtClean="0"/>
-              <a:pPr/>
-              <a:t>30</a:t>
-            </a:fld>
-            <a:endParaRPr lang="en-US"/>
-          </a:p>
-        </p:txBody>
-      </p:sp>
-      <p:sp>
-        <p:nvSpPr>
-          <p:cNvPr id="6" name="TextBox 5"/>
-          <p:cNvSpPr txBox="1"/>
-          <p:nvPr/>
-        </p:nvSpPr>
-        <p:spPr>
-          <a:xfrm>
-            <a:off x="791580" y="309592"/>
-            <a:ext cx="7560840" cy="4524315"/>
-          </a:xfrm>
-          <a:prstGeom prst="rect">
-            <a:avLst/>
-          </a:prstGeom>
-          <a:noFill/>
-        </p:spPr>
-        <p:txBody>
-          <a:bodyPr wrap="square" rtlCol="0">
-            <a:spAutoFit/>
-          </a:bodyPr>
-          <a:lstStyle/>
-          <a:p>
-            <a:r>
-              <a:rPr lang="en-US" sz="1800" dirty="0">
-                <a:latin typeface="Consolas" panose="020B0609020204030204" pitchFamily="49" charset="0"/>
-                <a:cs typeface="Consolas" panose="020B0609020204030204" pitchFamily="49" charset="0"/>
-              </a:rPr>
-              <a:t>#include &lt;</a:t>
-            </a:r>
-            <a:r>
-              <a:rPr lang="en-US" sz="1800" dirty="0" err="1">
-                <a:latin typeface="Consolas" panose="020B0609020204030204" pitchFamily="49" charset="0"/>
-                <a:cs typeface="Consolas" panose="020B0609020204030204" pitchFamily="49" charset="0"/>
-              </a:rPr>
-              <a:t>stdio.h</a:t>
-            </a:r>
-            <a:r>
-              <a:rPr lang="en-US" sz="1800" dirty="0">
-                <a:latin typeface="Consolas" panose="020B0609020204030204" pitchFamily="49" charset="0"/>
-                <a:cs typeface="Consolas" panose="020B0609020204030204" pitchFamily="49" charset="0"/>
-              </a:rPr>
-              <a:t>&gt;</a:t>
-            </a:r>
-          </a:p>
-          <a:p>
-            <a:endParaRPr lang="en-US" sz="1800" dirty="0">
-              <a:latin typeface="Consolas" panose="020B0609020204030204" pitchFamily="49" charset="0"/>
-              <a:cs typeface="Consolas" panose="020B0609020204030204" pitchFamily="49" charset="0"/>
-            </a:endParaRPr>
-          </a:p>
-          <a:p>
-            <a:r>
-              <a:rPr lang="en-US" sz="1800" dirty="0">
-                <a:latin typeface="Consolas" panose="020B0609020204030204" pitchFamily="49" charset="0"/>
-                <a:cs typeface="Consolas" panose="020B0609020204030204" pitchFamily="49" charset="0"/>
-              </a:rPr>
-              <a:t>main () </a:t>
-            </a:r>
-          </a:p>
-          <a:p>
-            <a:r>
-              <a:rPr lang="en-US" sz="1800" dirty="0">
-                <a:latin typeface="Consolas" panose="020B0609020204030204" pitchFamily="49" charset="0"/>
-                <a:cs typeface="Consolas" panose="020B0609020204030204" pitchFamily="49" charset="0"/>
-              </a:rPr>
-              <a:t>{ </a:t>
-            </a:r>
-          </a:p>
-          <a:p>
-            <a:r>
-              <a:rPr lang="en-US" sz="1800" dirty="0">
-                <a:latin typeface="Consolas" panose="020B0609020204030204" pitchFamily="49" charset="0"/>
-                <a:cs typeface="Consolas" panose="020B0609020204030204" pitchFamily="49" charset="0"/>
-              </a:rPr>
-              <a:t>      </a:t>
-            </a:r>
-            <a:r>
-              <a:rPr lang="en-US" sz="1800" dirty="0" err="1">
-                <a:latin typeface="Consolas" panose="020B0609020204030204" pitchFamily="49" charset="0"/>
-                <a:cs typeface="Consolas" panose="020B0609020204030204" pitchFamily="49" charset="0"/>
-              </a:rPr>
-              <a:t>int</a:t>
-            </a:r>
-            <a:r>
-              <a:rPr lang="en-US" sz="1800" dirty="0">
-                <a:latin typeface="Consolas" panose="020B0609020204030204" pitchFamily="49" charset="0"/>
-                <a:cs typeface="Consolas" panose="020B0609020204030204" pitchFamily="49" charset="0"/>
-              </a:rPr>
-              <a:t> </a:t>
-            </a:r>
-            <a:r>
-              <a:rPr lang="en-US" sz="1800" dirty="0" err="1">
-                <a:latin typeface="Consolas" panose="020B0609020204030204" pitchFamily="49" charset="0"/>
-                <a:cs typeface="Consolas" panose="020B0609020204030204" pitchFamily="49" charset="0"/>
-              </a:rPr>
-              <a:t>n</a:t>
-            </a:r>
-            <a:r>
-              <a:rPr lang="en-US" sz="1800" dirty="0">
-                <a:latin typeface="Consolas" panose="020B0609020204030204" pitchFamily="49" charset="0"/>
-                <a:cs typeface="Consolas" panose="020B0609020204030204" pitchFamily="49" charset="0"/>
-              </a:rPr>
-              <a:t> = 10;</a:t>
-            </a:r>
-          </a:p>
-          <a:p>
-            <a:r>
-              <a:rPr lang="en-US" sz="1800" dirty="0">
-                <a:latin typeface="Consolas" panose="020B0609020204030204" pitchFamily="49" charset="0"/>
-                <a:cs typeface="Consolas" panose="020B0609020204030204" pitchFamily="49" charset="0"/>
-              </a:rPr>
-              <a:t>      </a:t>
-            </a:r>
-            <a:r>
-              <a:rPr lang="en-US" sz="1800" dirty="0" err="1">
-                <a:latin typeface="Consolas" panose="020B0609020204030204" pitchFamily="49" charset="0"/>
-                <a:cs typeface="Consolas" panose="020B0609020204030204" pitchFamily="49" charset="0"/>
-              </a:rPr>
-              <a:t>printf("The</a:t>
-            </a:r>
-            <a:r>
-              <a:rPr lang="en-US" sz="1800" dirty="0">
-                <a:latin typeface="Consolas" panose="020B0609020204030204" pitchFamily="49" charset="0"/>
-                <a:cs typeface="Consolas" panose="020B0609020204030204" pitchFamily="49" charset="0"/>
-              </a:rPr>
-              <a:t> factorial of 10 is %</a:t>
-            </a:r>
-            <a:r>
-              <a:rPr lang="en-US" sz="1800" dirty="0" err="1">
-                <a:latin typeface="Consolas" panose="020B0609020204030204" pitchFamily="49" charset="0"/>
-                <a:cs typeface="Consolas" panose="020B0609020204030204" pitchFamily="49" charset="0"/>
-              </a:rPr>
-              <a:t>d\n</a:t>
-            </a:r>
-            <a:r>
-              <a:rPr lang="en-US" sz="1800" dirty="0">
-                <a:latin typeface="Consolas" panose="020B0609020204030204" pitchFamily="49" charset="0"/>
-                <a:cs typeface="Consolas" panose="020B0609020204030204" pitchFamily="49" charset="0"/>
-              </a:rPr>
-              <a:t>", </a:t>
-            </a:r>
-            <a:r>
-              <a:rPr lang="en-US" sz="1800" dirty="0" err="1">
-                <a:latin typeface="Consolas" panose="020B0609020204030204" pitchFamily="49" charset="0"/>
-                <a:cs typeface="Consolas" panose="020B0609020204030204" pitchFamily="49" charset="0"/>
-              </a:rPr>
-              <a:t>fact(n</a:t>
-            </a:r>
-            <a:r>
-              <a:rPr lang="en-US" sz="1800" dirty="0">
-                <a:latin typeface="Consolas" panose="020B0609020204030204" pitchFamily="49" charset="0"/>
-                <a:cs typeface="Consolas" panose="020B0609020204030204" pitchFamily="49" charset="0"/>
-              </a:rPr>
-              <a:t>)); </a:t>
-            </a:r>
-          </a:p>
-          <a:p>
-            <a:r>
-              <a:rPr lang="en-US" sz="1800" dirty="0">
-                <a:latin typeface="Consolas" panose="020B0609020204030204" pitchFamily="49" charset="0"/>
-                <a:cs typeface="Consolas" panose="020B0609020204030204" pitchFamily="49" charset="0"/>
-              </a:rPr>
-              <a:t>} </a:t>
-            </a:r>
-          </a:p>
-          <a:p>
-            <a:endParaRPr lang="en-US" sz="1800" dirty="0">
-              <a:latin typeface="Consolas" panose="020B0609020204030204" pitchFamily="49" charset="0"/>
-              <a:cs typeface="Consolas" panose="020B0609020204030204" pitchFamily="49" charset="0"/>
-            </a:endParaRPr>
-          </a:p>
-          <a:p>
-            <a:r>
-              <a:rPr lang="en-US" sz="1800" dirty="0" err="1">
-                <a:latin typeface="Consolas" panose="020B0609020204030204" pitchFamily="49" charset="0"/>
-                <a:cs typeface="Consolas" panose="020B0609020204030204" pitchFamily="49" charset="0"/>
-              </a:rPr>
-              <a:t>int</a:t>
-            </a:r>
-            <a:r>
-              <a:rPr lang="en-US" sz="1800" dirty="0">
-                <a:latin typeface="Consolas" panose="020B0609020204030204" pitchFamily="49" charset="0"/>
-                <a:cs typeface="Consolas" panose="020B0609020204030204" pitchFamily="49" charset="0"/>
-              </a:rPr>
-              <a:t> fact (</a:t>
-            </a:r>
-            <a:r>
-              <a:rPr lang="en-US" sz="1800" dirty="0" err="1">
-                <a:latin typeface="Consolas" panose="020B0609020204030204" pitchFamily="49" charset="0"/>
-                <a:cs typeface="Consolas" panose="020B0609020204030204" pitchFamily="49" charset="0"/>
-              </a:rPr>
-              <a:t>int</a:t>
-            </a:r>
-            <a:r>
-              <a:rPr lang="en-US" sz="1800" dirty="0">
-                <a:latin typeface="Consolas" panose="020B0609020204030204" pitchFamily="49" charset="0"/>
-                <a:cs typeface="Consolas" panose="020B0609020204030204" pitchFamily="49" charset="0"/>
-              </a:rPr>
-              <a:t> </a:t>
-            </a:r>
-            <a:r>
-              <a:rPr lang="en-US" sz="1800" dirty="0" err="1">
-                <a:latin typeface="Consolas" panose="020B0609020204030204" pitchFamily="49" charset="0"/>
-                <a:cs typeface="Consolas" panose="020B0609020204030204" pitchFamily="49" charset="0"/>
-              </a:rPr>
-              <a:t>n</a:t>
-            </a:r>
-            <a:r>
-              <a:rPr lang="en-US" sz="1800" dirty="0">
-                <a:latin typeface="Consolas" panose="020B0609020204030204" pitchFamily="49" charset="0"/>
-                <a:cs typeface="Consolas" panose="020B0609020204030204" pitchFamily="49" charset="0"/>
-              </a:rPr>
-              <a:t>) </a:t>
-            </a:r>
-          </a:p>
-          <a:p>
-            <a:r>
-              <a:rPr lang="en-US" sz="1800" dirty="0">
-                <a:latin typeface="Consolas" panose="020B0609020204030204" pitchFamily="49" charset="0"/>
-                <a:cs typeface="Consolas" panose="020B0609020204030204" pitchFamily="49" charset="0"/>
-              </a:rPr>
-              <a:t>{ </a:t>
-            </a:r>
-          </a:p>
-          <a:p>
-            <a:r>
-              <a:rPr lang="en-US" sz="1800" dirty="0">
-                <a:latin typeface="Consolas" panose="020B0609020204030204" pitchFamily="49" charset="0"/>
-                <a:cs typeface="Consolas" panose="020B0609020204030204" pitchFamily="49" charset="0"/>
-              </a:rPr>
-              <a:t>      if (</a:t>
-            </a:r>
-            <a:r>
-              <a:rPr lang="en-US" sz="1800" dirty="0" err="1">
-                <a:latin typeface="Consolas" panose="020B0609020204030204" pitchFamily="49" charset="0"/>
-                <a:cs typeface="Consolas" panose="020B0609020204030204" pitchFamily="49" charset="0"/>
-              </a:rPr>
-              <a:t>n</a:t>
-            </a:r>
-            <a:r>
-              <a:rPr lang="en-US" sz="1800" dirty="0">
-                <a:latin typeface="Consolas" panose="020B0609020204030204" pitchFamily="49" charset="0"/>
-                <a:cs typeface="Consolas" panose="020B0609020204030204" pitchFamily="49" charset="0"/>
-              </a:rPr>
-              <a:t> &lt; 1) </a:t>
-            </a:r>
-          </a:p>
-          <a:p>
-            <a:r>
-              <a:rPr lang="en-US" sz="1800" dirty="0">
-                <a:latin typeface="Consolas" panose="020B0609020204030204" pitchFamily="49" charset="0"/>
-                <a:cs typeface="Consolas" panose="020B0609020204030204" pitchFamily="49" charset="0"/>
-              </a:rPr>
-              <a:t>            return(1); </a:t>
-            </a:r>
-          </a:p>
-          <a:p>
-            <a:r>
-              <a:rPr lang="en-US" sz="1800" dirty="0">
-                <a:latin typeface="Consolas" panose="020B0609020204030204" pitchFamily="49" charset="0"/>
-                <a:cs typeface="Consolas" panose="020B0609020204030204" pitchFamily="49" charset="0"/>
-              </a:rPr>
-              <a:t>      else </a:t>
-            </a:r>
-          </a:p>
-          <a:p>
-            <a:r>
-              <a:rPr lang="en-US" sz="1800" dirty="0">
-                <a:latin typeface="Consolas" panose="020B0609020204030204" pitchFamily="49" charset="0"/>
-                <a:cs typeface="Consolas" panose="020B0609020204030204" pitchFamily="49" charset="0"/>
-              </a:rPr>
-              <a:t>            </a:t>
-            </a:r>
-            <a:r>
-              <a:rPr lang="en-US" sz="1800" dirty="0" err="1">
-                <a:latin typeface="Consolas" panose="020B0609020204030204" pitchFamily="49" charset="0"/>
-                <a:cs typeface="Consolas" panose="020B0609020204030204" pitchFamily="49" charset="0"/>
-              </a:rPr>
-              <a:t>return(n</a:t>
-            </a:r>
-            <a:r>
-              <a:rPr lang="en-US" sz="1800" dirty="0">
-                <a:latin typeface="Consolas" panose="020B0609020204030204" pitchFamily="49" charset="0"/>
-                <a:cs typeface="Consolas" panose="020B0609020204030204" pitchFamily="49" charset="0"/>
-              </a:rPr>
-              <a:t> * </a:t>
-            </a:r>
-            <a:r>
-              <a:rPr lang="en-US" sz="1800" dirty="0" err="1">
-                <a:latin typeface="Consolas" panose="020B0609020204030204" pitchFamily="49" charset="0"/>
-                <a:cs typeface="Consolas" panose="020B0609020204030204" pitchFamily="49" charset="0"/>
-              </a:rPr>
-              <a:t>fact(n</a:t>
-            </a:r>
-            <a:r>
-              <a:rPr lang="en-US" sz="1800" dirty="0">
-                <a:latin typeface="Consolas" panose="020B0609020204030204" pitchFamily="49" charset="0"/>
-                <a:cs typeface="Consolas" panose="020B0609020204030204" pitchFamily="49" charset="0"/>
-              </a:rPr>
-              <a:t> - 1)); </a:t>
-            </a:r>
-          </a:p>
-          <a:p>
-            <a:r>
-              <a:rPr lang="en-US" sz="1800" dirty="0">
-                <a:latin typeface="Consolas" panose="020B0609020204030204" pitchFamily="49" charset="0"/>
-                <a:cs typeface="Consolas" panose="020B0609020204030204" pitchFamily="49" charset="0"/>
-              </a:rPr>
-              <a:t>} </a:t>
-            </a:r>
-          </a:p>
-          <a:p>
-            <a:endParaRPr lang="en-US" sz="1800" dirty="0" err="1">
-              <a:latin typeface="Consolas" panose="020B0609020204030204" pitchFamily="49" charset="0"/>
-              <a:cs typeface="Consolas" panose="020B0609020204030204" pitchFamily="49" charset="0"/>
-            </a:endParaRPr>
-          </a:p>
-        </p:txBody>
-      </p:sp>
-    </p:spTree>
-    <p:extLst>
-      <p:ext uri="{BB962C8B-B14F-4D97-AF65-F5344CB8AC3E}">
-        <p14:creationId xmlns:p14="http://schemas.microsoft.com/office/powerpoint/2010/main" val="1716995604"/>
-      </p:ext>
-    </p:extLst>
-  </p:cSld>
-  <p:clrMapOvr>
-    <a:masterClrMapping/>
-  </p:clrMapOvr>
-</p:sld>
-</file>
-
-<file path=ppt/slides/slide31.xml><?xml version="1.0" encoding="utf-8"?>
-<p:sld xmlns:a="http://schemas.openxmlformats.org/drawingml/2006/main" xmlns:r="http://schemas.openxmlformats.org/officeDocument/2006/relationships" xmlns:p="http://schemas.openxmlformats.org/presentationml/2006/main">
-  <p:cSld>
-    <p:spTree>
-      <p:nvGrpSpPr>
-        <p:cNvPr id="1" name=""/>
-        <p:cNvGrpSpPr/>
-        <p:nvPr/>
-      </p:nvGrpSpPr>
-      <p:grpSpPr>
-        <a:xfrm>
-          <a:off x="0" y="0"/>
-          <a:ext cx="0" cy="0"/>
-          <a:chOff x="0" y="0"/>
-          <a:chExt cx="0" cy="0"/>
-        </a:xfrm>
-      </p:grpSpPr>
-      <p:sp>
-        <p:nvSpPr>
-          <p:cNvPr id="4" name="Slide Number Placeholder 3"/>
-          <p:cNvSpPr>
-            <a:spLocks noGrp="1"/>
-          </p:cNvSpPr>
-          <p:nvPr>
-            <p:ph type="sldNum" sz="quarter" idx="12"/>
-          </p:nvPr>
-        </p:nvSpPr>
-        <p:spPr/>
-        <p:txBody>
-          <a:bodyPr/>
-          <a:lstStyle/>
-          <a:p>
-            <a:fld id="{9AC591AD-4D89-CD47-B3D5-BB1C3EB73C69}" type="slidenum">
-              <a:rPr lang="en-US"/>
-              <a:pPr/>
-              <a:t>31</a:t>
-            </a:fld>
-            <a:endParaRPr lang="en-US"/>
-          </a:p>
-        </p:txBody>
-      </p:sp>
-      <p:pic>
-        <p:nvPicPr>
-          <p:cNvPr id="95236" name="Picture 4"/>
-          <p:cNvPicPr>
-            <a:picLocks noChangeAspect="1" noChangeArrowheads="1"/>
-          </p:cNvPicPr>
-          <p:nvPr/>
-        </p:nvPicPr>
-        <p:blipFill>
-          <a:blip r:embed="rId3"/>
-          <a:srcRect/>
-          <a:stretch>
-            <a:fillRect/>
-          </a:stretch>
-        </p:blipFill>
-        <p:spPr bwMode="auto">
-          <a:xfrm>
-            <a:off x="3674994" y="0"/>
-            <a:ext cx="3543300" cy="5143500"/>
-          </a:xfrm>
-          <a:prstGeom prst="rect">
-            <a:avLst/>
-          </a:prstGeom>
-          <a:noFill/>
-          <a:ln w="9525">
-            <a:noFill/>
-            <a:miter lim="800000"/>
-            <a:headEnd/>
-            <a:tailEnd/>
-          </a:ln>
-          <a:effectLst/>
-        </p:spPr>
-      </p:pic>
-      <p:sp>
-        <p:nvSpPr>
-          <p:cNvPr id="2" name="Rounded Rectangular Callout 1"/>
-          <p:cNvSpPr/>
-          <p:nvPr/>
-        </p:nvSpPr>
-        <p:spPr bwMode="auto">
-          <a:xfrm>
-            <a:off x="1385647" y="1851670"/>
-            <a:ext cx="2135345" cy="486906"/>
-          </a:xfrm>
-          <a:prstGeom prst="wedgeRoundRectCallout">
-            <a:avLst>
-              <a:gd name="adj1" fmla="val 64075"/>
-              <a:gd name="adj2" fmla="val -31361"/>
-              <a:gd name="adj3" fmla="val 16667"/>
-            </a:avLst>
-          </a:prstGeom>
-          <a:solidFill>
-            <a:schemeClr val="accent5">
-              <a:lumMod val="40000"/>
-              <a:lumOff val="60000"/>
-            </a:schemeClr>
-          </a:solidFill>
-          <a:ln w="9525" cap="flat" cmpd="sng" algn="ctr">
-            <a:solidFill>
-              <a:schemeClr val="tx1"/>
-            </a:solidFill>
-            <a:prstDash val="solid"/>
-            <a:round/>
-            <a:headEnd type="none" w="med" len="med"/>
-            <a:tailEnd type="none" w="med" len="med"/>
-          </a:ln>
-          <a:effectLst/>
-        </p:spPr>
-        <p:txBody>
-          <a:bodyPr vert="horz" wrap="square" lIns="68580" tIns="34290" rIns="68580" bIns="34290" numCol="1" rtlCol="0" anchor="t" anchorCtr="0" compatLnSpc="1">
-            <a:prstTxWarp prst="textNoShape">
-              <a:avLst/>
-            </a:prstTxWarp>
-          </a:bodyPr>
-          <a:lstStyle/>
-          <a:p>
-            <a:pPr defTabSz="685800"/>
-            <a:r>
-              <a:rPr lang="en-CA" sz="1500" dirty="0">
-                <a:latin typeface="Calibri" panose="020F0502020204030204" pitchFamily="34" charset="0"/>
-              </a:rPr>
-              <a:t>return address in main</a:t>
-            </a:r>
-          </a:p>
-        </p:txBody>
-      </p:sp>
-      <p:sp>
-        <p:nvSpPr>
-          <p:cNvPr id="6" name="Rounded Rectangular Callout 5"/>
-          <p:cNvSpPr/>
-          <p:nvPr/>
-        </p:nvSpPr>
-        <p:spPr bwMode="auto">
-          <a:xfrm>
-            <a:off x="1385647" y="1167594"/>
-            <a:ext cx="2135345" cy="486906"/>
-          </a:xfrm>
-          <a:prstGeom prst="wedgeRoundRectCallout">
-            <a:avLst>
-              <a:gd name="adj1" fmla="val 67086"/>
-              <a:gd name="adj2" fmla="val 45665"/>
-              <a:gd name="adj3" fmla="val 16667"/>
-            </a:avLst>
-          </a:prstGeom>
-          <a:solidFill>
-            <a:schemeClr val="accent5">
-              <a:lumMod val="40000"/>
-              <a:lumOff val="60000"/>
-            </a:schemeClr>
-          </a:solidFill>
-          <a:ln w="9525" cap="flat" cmpd="sng" algn="ctr">
-            <a:solidFill>
-              <a:schemeClr val="tx1"/>
-            </a:solidFill>
-            <a:prstDash val="solid"/>
-            <a:round/>
-            <a:headEnd type="none" w="med" len="med"/>
-            <a:tailEnd type="none" w="med" len="med"/>
-          </a:ln>
-          <a:effectLst/>
-        </p:spPr>
-        <p:txBody>
-          <a:bodyPr vert="horz" wrap="square" lIns="68580" tIns="34290" rIns="68580" bIns="34290" numCol="1" rtlCol="0" anchor="t" anchorCtr="0" compatLnSpc="1">
-            <a:prstTxWarp prst="textNoShape">
-              <a:avLst/>
-            </a:prstTxWarp>
-          </a:bodyPr>
-          <a:lstStyle/>
-          <a:p>
-            <a:pPr defTabSz="685800"/>
-            <a:r>
-              <a:rPr lang="en-CA" sz="1500" dirty="0">
-                <a:latin typeface="Calibri" panose="020F0502020204030204" pitchFamily="34" charset="0"/>
-              </a:rPr>
-              <a:t>$a0(=10) saved in stack</a:t>
-            </a:r>
-          </a:p>
-        </p:txBody>
-      </p:sp>
-    </p:spTree>
-    <p:extLst>
-      <p:ext uri="{BB962C8B-B14F-4D97-AF65-F5344CB8AC3E}">
-        <p14:creationId xmlns:p14="http://schemas.microsoft.com/office/powerpoint/2010/main" val="1753052689"/>
-      </p:ext>
-    </p:extLst>
-  </p:cSld>
-  <p:clrMapOvr>
-    <a:masterClrMapping/>
-  </p:clrMapOvr>
-  <p:timing>
-    <p:tnLst>
-      <p:par>
-        <p:cTn id="1" dur="indefinite" restart="never" nodeType="tmRoot">
-          <p:childTnLst>
-            <p:seq concurrent="1" nextAc="seek">
-              <p:cTn id="2" dur="indefinite" nodeType="mainSeq">
-                <p:childTnLst>
-                  <p:par>
-                    <p:cTn id="3" fill="hold">
-                      <p:stCondLst>
-                        <p:cond delay="indefinite"/>
-                      </p:stCondLst>
-                      <p:childTnLst>
-                        <p:par>
-                          <p:cTn id="4" fill="hold">
-                            <p:stCondLst>
-                              <p:cond delay="0"/>
-                            </p:stCondLst>
-                            <p:childTnLst>
-                              <p:par>
-                                <p:cTn id="5" presetID="1" presetClass="entr" presetSubtype="0" fill="hold" grpId="0" nodeType="clickEffect">
-                                  <p:stCondLst>
-                                    <p:cond delay="0"/>
-                                  </p:stCondLst>
-                                  <p:childTnLst>
-                                    <p:set>
-                                      <p:cBhvr>
-                                        <p:cTn id="6" dur="1" fill="hold">
-                                          <p:stCondLst>
-                                            <p:cond delay="0"/>
-                                          </p:stCondLst>
-                                        </p:cTn>
-                                        <p:tgtEl>
-                                          <p:spTgt spid="2"/>
-                                        </p:tgtEl>
-                                        <p:attrNameLst>
-                                          <p:attrName>style.visibility</p:attrName>
-                                        </p:attrNameLst>
-                                      </p:cBhvr>
-                                      <p:to>
-                                        <p:strVal val="visible"/>
-                                      </p:to>
-                                    </p:set>
-                                  </p:childTnLst>
-                                </p:cTn>
-                              </p:par>
-                            </p:childTnLst>
-                          </p:cTn>
-                        </p:par>
-                      </p:childTnLst>
-                    </p:cTn>
-                  </p:par>
-                  <p:par>
-                    <p:cTn id="7" fill="hold">
-                      <p:stCondLst>
-                        <p:cond delay="indefinite"/>
-                      </p:stCondLst>
-                      <p:childTnLst>
-                        <p:par>
-                          <p:cTn id="8" fill="hold">
-                            <p:stCondLst>
-                              <p:cond delay="0"/>
-                            </p:stCondLst>
-                            <p:childTnLst>
-                              <p:par>
-                                <p:cTn id="9" presetID="1" presetClass="entr" presetSubtype="0" fill="hold" grpId="0" nodeType="clickEffect">
-                                  <p:stCondLst>
-                                    <p:cond delay="0"/>
-                                  </p:stCondLst>
-                                  <p:childTnLst>
-                                    <p:set>
-                                      <p:cBhvr>
-                                        <p:cTn id="10" dur="1" fill="hold">
-                                          <p:stCondLst>
-                                            <p:cond delay="0"/>
-                                          </p:stCondLst>
-                                        </p:cTn>
-                                        <p:tgtEl>
-                                          <p:spTgt spid="6"/>
-                                        </p:tgtEl>
-                                        <p:attrNameLst>
-                                          <p:attrName>style.visibility</p:attrName>
-                                        </p:attrNameLst>
-                                      </p:cBhvr>
-                                      <p:to>
-                                        <p:strVal val="visible"/>
-                                      </p:to>
-                                    </p:set>
-                                  </p:childTnLst>
-                                </p:cTn>
-                              </p:par>
-                            </p:childTnLst>
-                          </p:cTn>
-                        </p:par>
-                      </p:childTnLst>
-                    </p:cTn>
-                  </p:par>
-                </p:childTnLst>
-              </p:cTn>
-              <p:prevCondLst>
-                <p:cond evt="onPrev" delay="0">
-                  <p:tgtEl>
-                    <p:sldTgt/>
-                  </p:tgtEl>
-                </p:cond>
-              </p:prevCondLst>
-              <p:nextCondLst>
-                <p:cond evt="onNext" delay="0">
-                  <p:tgtEl>
-                    <p:sldTgt/>
-                  </p:tgtEl>
-                </p:cond>
-              </p:nextCondLst>
-            </p:seq>
-          </p:childTnLst>
-        </p:cTn>
-      </p:par>
-    </p:tnLst>
-    <p:bldLst>
-      <p:bldP spid="2" grpId="0" animBg="1"/>
-      <p:bldP spid="6" grpId="0" animBg="1"/>
-    </p:bldLst>
-  </p:timing>
-</p:sld>
-</file>
-
-<file path=ppt/slides/slide32.xml><?xml version="1.0" encoding="utf-8"?>
-<p:sld xmlns:a="http://schemas.openxmlformats.org/drawingml/2006/main" xmlns:r="http://schemas.openxmlformats.org/officeDocument/2006/relationships" xmlns:p="http://schemas.openxmlformats.org/presentationml/2006/main">
-  <p:cSld>
-    <p:spTree>
-      <p:nvGrpSpPr>
-        <p:cNvPr id="1" name=""/>
-        <p:cNvGrpSpPr/>
-        <p:nvPr/>
-      </p:nvGrpSpPr>
-      <p:grpSpPr>
-        <a:xfrm>
-          <a:off x="0" y="0"/>
-          <a:ext cx="0" cy="0"/>
-          <a:chOff x="0" y="0"/>
-          <a:chExt cx="0" cy="0"/>
-        </a:xfrm>
-      </p:grpSpPr>
-      <p:sp>
-        <p:nvSpPr>
-          <p:cNvPr id="2" name="Title 1"/>
-          <p:cNvSpPr>
-            <a:spLocks noGrp="1"/>
-          </p:cNvSpPr>
-          <p:nvPr>
-            <p:ph type="title"/>
-          </p:nvPr>
-        </p:nvSpPr>
-        <p:spPr/>
-        <p:txBody>
-          <a:bodyPr/>
-          <a:lstStyle/>
-          <a:p>
-            <a:r>
-              <a:rPr lang="en-CA" dirty="0"/>
-              <a:t>Global Variables</a:t>
-            </a:r>
-          </a:p>
-        </p:txBody>
-      </p:sp>
-      <p:sp>
-        <p:nvSpPr>
-          <p:cNvPr id="3" name="Content Placeholder 2"/>
-          <p:cNvSpPr>
-            <a:spLocks noGrp="1"/>
-          </p:cNvSpPr>
-          <p:nvPr>
-            <p:ph idx="1"/>
-          </p:nvPr>
-        </p:nvSpPr>
-        <p:spPr/>
-        <p:txBody>
-          <a:bodyPr/>
-          <a:lstStyle/>
-          <a:p>
-            <a:r>
-              <a:rPr lang="en-CA" dirty="0"/>
-              <a:t>All references to a global variable point to the same object</a:t>
-            </a:r>
-          </a:p>
-          <a:p>
-            <a:pPr lvl="1"/>
-            <a:r>
-              <a:rPr lang="en-CA" dirty="0">
-                <a:solidFill>
-                  <a:schemeClr val="accent2"/>
-                </a:solidFill>
-              </a:rPr>
-              <a:t>Cannot store a global in an activation record</a:t>
-            </a:r>
-          </a:p>
-          <a:p>
-            <a:r>
-              <a:rPr lang="en-CA" dirty="0" err="1"/>
-              <a:t>Globals</a:t>
-            </a:r>
-            <a:r>
-              <a:rPr lang="en-CA" dirty="0"/>
-              <a:t> are assigned a fixed address once </a:t>
-            </a:r>
-          </a:p>
-          <a:p>
-            <a:pPr lvl="1"/>
-            <a:r>
-              <a:rPr lang="en-CA" dirty="0">
-                <a:solidFill>
-                  <a:schemeClr val="accent2"/>
-                </a:solidFill>
-              </a:rPr>
-              <a:t>Variables with fixed address are “statically allocated”</a:t>
-            </a:r>
-          </a:p>
-          <a:p>
-            <a:r>
-              <a:rPr lang="en-CA" dirty="0"/>
-              <a:t>Depending on the language, there may be other statically allocated values</a:t>
-            </a:r>
-          </a:p>
-        </p:txBody>
-      </p:sp>
-      <p:sp>
-        <p:nvSpPr>
-          <p:cNvPr id="5" name="Slide Number Placeholder 4"/>
-          <p:cNvSpPr>
-            <a:spLocks noGrp="1"/>
-          </p:cNvSpPr>
-          <p:nvPr>
-            <p:ph type="sldNum" sz="quarter" idx="12"/>
-          </p:nvPr>
-        </p:nvSpPr>
-        <p:spPr/>
-        <p:txBody>
-          <a:bodyPr/>
-          <a:lstStyle/>
-          <a:p>
-            <a:fld id="{EFA508D8-6740-FE46-95CC-F1012A7A27C5}" type="slidenum">
-              <a:rPr lang="en-US" smtClean="0"/>
-              <a:pPr/>
-              <a:t>32</a:t>
+              <a:t>29</a:t>
             </a:fld>
             <a:endParaRPr lang="en-US"/>
           </a:p>
@@ -27114,7 +25751,7 @@
 </p:sld>
 </file>
 
-<file path=ppt/slides/slide33.xml><?xml version="1.0" encoding="utf-8"?>
+<file path=ppt/slides/slide3.xml><?xml version="1.0" encoding="utf-8"?>
 <p:sld xmlns:a="http://schemas.openxmlformats.org/drawingml/2006/main" xmlns:r="http://schemas.openxmlformats.org/officeDocument/2006/relationships" xmlns:p="http://schemas.openxmlformats.org/presentationml/2006/main">
   <p:cSld>
     <p:spTree>
@@ -27148,6 +25785,131 @@
           <a:p>
             <a:r>
               <a:rPr lang="en-CA" dirty="0"/>
+              <a:t>Invoke the Program</a:t>
+            </a:r>
+          </a:p>
+        </p:txBody>
+      </p:sp>
+      <p:sp>
+        <p:nvSpPr>
+          <p:cNvPr id="3" name="Content Placeholder 2"/>
+          <p:cNvSpPr>
+            <a:spLocks noGrp="1"/>
+          </p:cNvSpPr>
+          <p:nvPr>
+            <p:ph idx="1"/>
+          </p:nvPr>
+        </p:nvSpPr>
+        <p:spPr/>
+        <p:txBody>
+          <a:bodyPr/>
+          <a:lstStyle/>
+          <a:p>
+            <a:r>
+              <a:rPr lang="en-CA" dirty="0"/>
+              <a:t>Execution of the program is initially under the control of the operating system</a:t>
+            </a:r>
+          </a:p>
+          <a:p>
+            <a:r>
+              <a:rPr lang="en-CA" dirty="0"/>
+              <a:t>When program is invoked:</a:t>
+            </a:r>
+          </a:p>
+          <a:p>
+            <a:pPr lvl="1"/>
+            <a:r>
+              <a:rPr lang="en-CA" dirty="0"/>
+              <a:t>The OS allocates space for the program</a:t>
+            </a:r>
+          </a:p>
+          <a:p>
+            <a:pPr lvl="1"/>
+            <a:r>
+              <a:rPr lang="en-CA" dirty="0"/>
+              <a:t>The code is loaded into part of the memory</a:t>
+            </a:r>
+          </a:p>
+          <a:p>
+            <a:pPr lvl="1"/>
+            <a:r>
+              <a:rPr lang="en-CA" dirty="0"/>
+              <a:t>The OS jumps to the entry point (i.e., main)</a:t>
+            </a:r>
+          </a:p>
+        </p:txBody>
+      </p:sp>
+      <p:sp>
+        <p:nvSpPr>
+          <p:cNvPr id="5" name="Slide Number Placeholder 4"/>
+          <p:cNvSpPr>
+            <a:spLocks noGrp="1"/>
+          </p:cNvSpPr>
+          <p:nvPr>
+            <p:ph type="sldNum" sz="quarter" idx="12"/>
+          </p:nvPr>
+        </p:nvSpPr>
+        <p:spPr/>
+        <p:txBody>
+          <a:bodyPr/>
+          <a:lstStyle/>
+          <a:p>
+            <a:fld id="{EFA508D8-6740-FE46-95CC-F1012A7A27C5}" type="slidenum">
+              <a:rPr lang="en-US" smtClean="0"/>
+              <a:pPr/>
+              <a:t>3</a:t>
+            </a:fld>
+            <a:endParaRPr lang="en-US"/>
+          </a:p>
+        </p:txBody>
+      </p:sp>
+    </p:spTree>
+    <p:extLst>
+      <p:ext uri="{BB962C8B-B14F-4D97-AF65-F5344CB8AC3E}">
+        <p14:creationId xmlns:p14="http://schemas.microsoft.com/office/powerpoint/2010/main" val="3676250933"/>
+      </p:ext>
+    </p:extLst>
+  </p:cSld>
+  <p:clrMapOvr>
+    <a:masterClrMapping/>
+  </p:clrMapOvr>
+</p:sld>
+</file>
+
+<file path=ppt/slides/slide30.xml><?xml version="1.0" encoding="utf-8"?>
+<p:sld xmlns:a="http://schemas.openxmlformats.org/drawingml/2006/main" xmlns:r="http://schemas.openxmlformats.org/officeDocument/2006/relationships" xmlns:p="http://schemas.openxmlformats.org/presentationml/2006/main">
+  <p:cSld>
+    <p:spTree>
+      <p:nvGrpSpPr>
+        <p:cNvPr id="1" name=""/>
+        <p:cNvGrpSpPr/>
+        <p:nvPr/>
+      </p:nvGrpSpPr>
+      <p:grpSpPr>
+        <a:xfrm>
+          <a:off x="0" y="0"/>
+          <a:ext cx="0" cy="0"/>
+          <a:chOff x="0" y="0"/>
+          <a:chExt cx="0" cy="0"/>
+        </a:xfrm>
+      </p:grpSpPr>
+      <p:sp>
+        <p:nvSpPr>
+          <p:cNvPr id="2" name="Title 1"/>
+          <p:cNvSpPr>
+            <a:spLocks noGrp="1"/>
+          </p:cNvSpPr>
+          <p:nvPr>
+            <p:ph type="title"/>
+          </p:nvPr>
+        </p:nvSpPr>
+        <p:spPr/>
+        <p:txBody>
+          <a:bodyPr/>
+          <a:lstStyle/>
+          <a:p>
+            <a:r>
+              <a:rPr lang="en-CA" dirty="0"/>
               <a:t>Memory Organization</a:t>
             </a:r>
           </a:p>
@@ -27171,7 +25933,7 @@
             <a:fld id="{3156C34B-FA17-A04E-B62C-CDBE808FCFDF}" type="slidenum">
               <a:rPr lang="en-US" smtClean="0"/>
               <a:pPr/>
-              <a:t>33</a:t>
+              <a:t>30</a:t>
             </a:fld>
             <a:endParaRPr lang="en-US"/>
           </a:p>
@@ -27758,7 +26520,7 @@
 </p:sld>
 </file>
 
-<file path=ppt/slides/slide34.xml><?xml version="1.0" encoding="utf-8"?>
+<file path=ppt/slides/slide31.xml><?xml version="1.0" encoding="utf-8"?>
 <p:sld xmlns:a="http://schemas.openxmlformats.org/drawingml/2006/main" xmlns:r="http://schemas.openxmlformats.org/officeDocument/2006/relationships" xmlns:p="http://schemas.openxmlformats.org/presentationml/2006/main">
   <p:cSld>
     <p:spTree>
@@ -27922,7 +26684,7 @@
             <a:fld id="{EFA508D8-6740-FE46-95CC-F1012A7A27C5}" type="slidenum">
               <a:rPr lang="en-US" smtClean="0"/>
               <a:pPr/>
-              <a:t>34</a:t>
+              <a:t>31</a:t>
             </a:fld>
             <a:endParaRPr lang="en-US"/>
           </a:p>
@@ -27941,7 +26703,7 @@
 </p:sld>
 </file>
 
-<file path=ppt/slides/slide35.xml><?xml version="1.0" encoding="utf-8"?>
+<file path=ppt/slides/slide32.xml><?xml version="1.0" encoding="utf-8"?>
 <p:sld xmlns:a="http://schemas.openxmlformats.org/drawingml/2006/main" xmlns:r="http://schemas.openxmlformats.org/officeDocument/2006/relationships" xmlns:p="http://schemas.openxmlformats.org/presentationml/2006/main">
   <p:cSld>
     <p:spTree>
@@ -28108,7 +26870,7 @@
             <a:fld id="{EFA508D8-6740-FE46-95CC-F1012A7A27C5}" type="slidenum">
               <a:rPr lang="en-US" smtClean="0"/>
               <a:pPr/>
-              <a:t>35</a:t>
+              <a:t>32</a:t>
             </a:fld>
             <a:endParaRPr lang="en-US"/>
           </a:p>
@@ -28477,7 +27239,7 @@
 </p:sld>
 </file>
 
-<file path=ppt/slides/slide36.xml><?xml version="1.0" encoding="utf-8"?>
+<file path=ppt/slides/slide33.xml><?xml version="1.0" encoding="utf-8"?>
 <p:sld xmlns:a="http://schemas.openxmlformats.org/drawingml/2006/main" xmlns:r="http://schemas.openxmlformats.org/officeDocument/2006/relationships" xmlns:p="http://schemas.openxmlformats.org/presentationml/2006/main">
   <p:cSld>
     <p:spTree>
@@ -28568,7 +27330,7 @@
             <a:fld id="{EFA508D8-6740-FE46-95CC-F1012A7A27C5}" type="slidenum">
               <a:rPr lang="en-US" smtClean="0"/>
               <a:pPr/>
-              <a:t>36</a:t>
+              <a:t>33</a:t>
             </a:fld>
             <a:endParaRPr lang="en-US"/>
           </a:p>
@@ -28587,7 +27349,7 @@
 </p:sld>
 </file>
 
-<file path=ppt/slides/slide37.xml><?xml version="1.0" encoding="utf-8"?>
+<file path=ppt/slides/slide34.xml><?xml version="1.0" encoding="utf-8"?>
 <p:sld xmlns:a="http://schemas.openxmlformats.org/drawingml/2006/main" xmlns:r="http://schemas.openxmlformats.org/officeDocument/2006/relationships" xmlns:p="http://schemas.openxmlformats.org/presentationml/2006/main">
   <p:cSld>
     <p:spTree>
@@ -28644,7 +27406,7 @@
             <a:fld id="{3156C34B-FA17-A04E-B62C-CDBE808FCFDF}" type="slidenum">
               <a:rPr lang="en-US" smtClean="0"/>
               <a:pPr/>
-              <a:t>37</a:t>
+              <a:t>34</a:t>
             </a:fld>
             <a:endParaRPr lang="en-US"/>
           </a:p>
@@ -29658,7 +28420,7 @@
 </p:sld>
 </file>
 
-<file path=ppt/slides/slide38.xml><?xml version="1.0" encoding="utf-8"?>
+<file path=ppt/slides/slide35.xml><?xml version="1.0" encoding="utf-8"?>
 <p:sld xmlns:a="http://schemas.openxmlformats.org/drawingml/2006/main" xmlns:r="http://schemas.openxmlformats.org/officeDocument/2006/relationships" xmlns:p="http://schemas.openxmlformats.org/presentationml/2006/main">
   <p:cSld>
     <p:spTree>
@@ -29789,7 +28551,7 @@
             <a:fld id="{EFA508D8-6740-FE46-95CC-F1012A7A27C5}" type="slidenum">
               <a:rPr lang="en-US" smtClean="0"/>
               <a:pPr/>
-              <a:t>38</a:t>
+              <a:t>35</a:t>
             </a:fld>
             <a:endParaRPr lang="en-US"/>
           </a:p>
@@ -29967,7 +28729,7 @@
 </p:sld>
 </file>
 
-<file path=ppt/slides/slide39.xml><?xml version="1.0" encoding="utf-8"?>
+<file path=ppt/slides/slide36.xml><?xml version="1.0" encoding="utf-8"?>
 <p:sld xmlns:a="http://schemas.openxmlformats.org/drawingml/2006/main" xmlns:r="http://schemas.openxmlformats.org/officeDocument/2006/relationships" xmlns:p="http://schemas.openxmlformats.org/presentationml/2006/main">
   <p:cSld>
     <p:spTree>
@@ -30100,7 +28862,7 @@
             <a:fld id="{EFA508D8-6740-FE46-95CC-F1012A7A27C5}" type="slidenum">
               <a:rPr lang="en-US" smtClean="0"/>
               <a:pPr/>
-              <a:t>39</a:t>
+              <a:t>36</a:t>
             </a:fld>
             <a:endParaRPr lang="en-US"/>
           </a:p>
@@ -30569,6 +29331,433 @@
       <p:bldP spid="9" grpId="0" animBg="1"/>
     </p:bldLst>
   </p:timing>
+</p:sld>
+</file>
+
+<file path=ppt/slides/slide37.xml><?xml version="1.0" encoding="utf-8"?>
+<p:sld xmlns:a="http://schemas.openxmlformats.org/drawingml/2006/main" xmlns:r="http://schemas.openxmlformats.org/officeDocument/2006/relationships" xmlns:p="http://schemas.openxmlformats.org/presentationml/2006/main">
+  <p:cSld>
+    <p:spTree>
+      <p:nvGrpSpPr>
+        <p:cNvPr id="1" name=""/>
+        <p:cNvGrpSpPr/>
+        <p:nvPr/>
+      </p:nvGrpSpPr>
+      <p:grpSpPr>
+        <a:xfrm>
+          <a:off x="0" y="0"/>
+          <a:ext cx="0" cy="0"/>
+          <a:chOff x="0" y="0"/>
+          <a:chExt cx="0" cy="0"/>
+        </a:xfrm>
+      </p:grpSpPr>
+      <p:sp>
+        <p:nvSpPr>
+          <p:cNvPr id="2" name="Title 1"/>
+          <p:cNvSpPr>
+            <a:spLocks noGrp="1"/>
+          </p:cNvSpPr>
+          <p:nvPr>
+            <p:ph type="title"/>
+          </p:nvPr>
+        </p:nvSpPr>
+        <p:spPr/>
+        <p:txBody>
+          <a:bodyPr/>
+          <a:lstStyle/>
+          <a:p>
+            <a:r>
+              <a:rPr lang="en-CA" dirty="0"/>
+              <a:t>Padding</a:t>
+            </a:r>
+          </a:p>
+        </p:txBody>
+      </p:sp>
+      <p:sp>
+        <p:nvSpPr>
+          <p:cNvPr id="3" name="Content Placeholder 2"/>
+          <p:cNvSpPr>
+            <a:spLocks noGrp="1"/>
+          </p:cNvSpPr>
+          <p:nvPr>
+            <p:ph idx="1"/>
+          </p:nvPr>
+        </p:nvSpPr>
+        <p:spPr/>
+        <p:txBody>
+          <a:bodyPr/>
+          <a:lstStyle/>
+          <a:p>
+            <a:r>
+              <a:rPr lang="en-CA" dirty="0"/>
+              <a:t>Compilers may insert unused bytes called "padding bytes" after structure members to ensure that each member is appropriately aligned.</a:t>
+            </a:r>
+          </a:p>
+          <a:p>
+            <a:pPr marL="685800" lvl="2" indent="0">
+              <a:buNone/>
+            </a:pPr>
+            <a:r>
+              <a:rPr lang="en-CA" dirty="0" err="1">
+                <a:latin typeface="Consolas" panose="020B0609020204030204" pitchFamily="49" charset="0"/>
+                <a:cs typeface="Consolas" panose="020B0609020204030204" pitchFamily="49" charset="0"/>
+              </a:rPr>
+              <a:t>struct</a:t>
+            </a:r>
+            <a:r>
+              <a:rPr lang="en-CA" dirty="0">
+                <a:latin typeface="Consolas" panose="020B0609020204030204" pitchFamily="49" charset="0"/>
+                <a:cs typeface="Consolas" panose="020B0609020204030204" pitchFamily="49" charset="0"/>
+              </a:rPr>
+              <a:t> widget {</a:t>
+            </a:r>
+          </a:p>
+          <a:p>
+            <a:pPr marL="685800" lvl="2" indent="0">
+              <a:buNone/>
+            </a:pPr>
+            <a:r>
+              <a:rPr lang="en-CA" dirty="0">
+                <a:latin typeface="Consolas" panose="020B0609020204030204" pitchFamily="49" charset="0"/>
+                <a:cs typeface="Consolas" panose="020B0609020204030204" pitchFamily="49" charset="0"/>
+              </a:rPr>
+              <a:t>    char m1;</a:t>
+            </a:r>
+          </a:p>
+          <a:p>
+            <a:pPr marL="685800" lvl="2" indent="0">
+              <a:buNone/>
+            </a:pPr>
+            <a:r>
+              <a:rPr lang="en-CA" dirty="0">
+                <a:latin typeface="Consolas" panose="020B0609020204030204" pitchFamily="49" charset="0"/>
+                <a:cs typeface="Consolas" panose="020B0609020204030204" pitchFamily="49" charset="0"/>
+              </a:rPr>
+              <a:t>    </a:t>
+            </a:r>
+            <a:r>
+              <a:rPr lang="en-CA" dirty="0" err="1">
+                <a:latin typeface="Consolas" panose="020B0609020204030204" pitchFamily="49" charset="0"/>
+                <a:cs typeface="Consolas" panose="020B0609020204030204" pitchFamily="49" charset="0"/>
+              </a:rPr>
+              <a:t>int</a:t>
+            </a:r>
+            <a:r>
+              <a:rPr lang="en-CA" dirty="0">
+                <a:latin typeface="Consolas" panose="020B0609020204030204" pitchFamily="49" charset="0"/>
+                <a:cs typeface="Consolas" panose="020B0609020204030204" pitchFamily="49" charset="0"/>
+              </a:rPr>
+              <a:t> m2;</a:t>
+            </a:r>
+          </a:p>
+          <a:p>
+            <a:pPr marL="685800" lvl="2" indent="0">
+              <a:buNone/>
+            </a:pPr>
+            <a:r>
+              <a:rPr lang="en-CA" dirty="0">
+                <a:latin typeface="Consolas" panose="020B0609020204030204" pitchFamily="49" charset="0"/>
+                <a:cs typeface="Consolas" panose="020B0609020204030204" pitchFamily="49" charset="0"/>
+              </a:rPr>
+              <a:t>    char m3;</a:t>
+            </a:r>
+          </a:p>
+          <a:p>
+            <a:pPr marL="685800" lvl="2" indent="0">
+              <a:buNone/>
+            </a:pPr>
+            <a:r>
+              <a:rPr lang="en-CA" dirty="0">
+                <a:latin typeface="Consolas" panose="020B0609020204030204" pitchFamily="49" charset="0"/>
+                <a:cs typeface="Consolas" panose="020B0609020204030204" pitchFamily="49" charset="0"/>
+              </a:rPr>
+              <a:t>};</a:t>
+            </a:r>
+          </a:p>
+          <a:p>
+            <a:pPr marL="342900" lvl="1" indent="0">
+              <a:buNone/>
+            </a:pPr>
+            <a:endParaRPr lang="en-CA" dirty="0"/>
+          </a:p>
+        </p:txBody>
+      </p:sp>
+      <p:sp>
+        <p:nvSpPr>
+          <p:cNvPr id="5" name="Slide Number Placeholder 4"/>
+          <p:cNvSpPr>
+            <a:spLocks noGrp="1"/>
+          </p:cNvSpPr>
+          <p:nvPr>
+            <p:ph type="sldNum" sz="quarter" idx="12"/>
+          </p:nvPr>
+        </p:nvSpPr>
+        <p:spPr/>
+        <p:txBody>
+          <a:bodyPr/>
+          <a:lstStyle/>
+          <a:p>
+            <a:fld id="{EFA508D8-6740-FE46-95CC-F1012A7A27C5}" type="slidenum">
+              <a:rPr lang="en-US" smtClean="0"/>
+              <a:pPr/>
+              <a:t>37</a:t>
+            </a:fld>
+            <a:endParaRPr lang="en-US"/>
+          </a:p>
+        </p:txBody>
+      </p:sp>
+      <p:sp>
+        <p:nvSpPr>
+          <p:cNvPr id="6" name="TextBox 5"/>
+          <p:cNvSpPr txBox="1"/>
+          <p:nvPr/>
+        </p:nvSpPr>
+        <p:spPr>
+          <a:xfrm>
+            <a:off x="4301970" y="3291683"/>
+            <a:ext cx="3024336" cy="923330"/>
+          </a:xfrm>
+          <a:prstGeom prst="rect">
+            <a:avLst/>
+          </a:prstGeom>
+          <a:noFill/>
+        </p:spPr>
+        <p:txBody>
+          <a:bodyPr wrap="square" rtlCol="0">
+            <a:spAutoFit/>
+          </a:bodyPr>
+          <a:lstStyle/>
+          <a:p>
+            <a:r>
+              <a:rPr lang="en-CA" sz="1800" dirty="0">
+                <a:solidFill>
+                  <a:schemeClr val="accent2"/>
+                </a:solidFill>
+                <a:latin typeface="Calibri" panose="020F0502020204030204" pitchFamily="34" charset="0"/>
+              </a:rPr>
+              <a:t>On a word aligned machine:</a:t>
+            </a:r>
+          </a:p>
+          <a:p>
+            <a:r>
+              <a:rPr lang="en-CA" sz="1800" dirty="0">
+                <a:solidFill>
+                  <a:schemeClr val="accent2"/>
+                </a:solidFill>
+                <a:latin typeface="Calibri" panose="020F0502020204030204" pitchFamily="34" charset="0"/>
+              </a:rPr>
+              <a:t>add 3 bytes of padding </a:t>
+            </a:r>
+          </a:p>
+          <a:p>
+            <a:r>
+              <a:rPr lang="en-CA" sz="1800" dirty="0">
+                <a:solidFill>
+                  <a:schemeClr val="accent2"/>
+                </a:solidFill>
+                <a:latin typeface="Calibri" panose="020F0502020204030204" pitchFamily="34" charset="0"/>
+              </a:rPr>
+              <a:t>after m1 and m3</a:t>
+            </a:r>
+          </a:p>
+        </p:txBody>
+      </p:sp>
+    </p:spTree>
+    <p:extLst>
+      <p:ext uri="{BB962C8B-B14F-4D97-AF65-F5344CB8AC3E}">
+        <p14:creationId xmlns:p14="http://schemas.microsoft.com/office/powerpoint/2010/main" val="2312361512"/>
+      </p:ext>
+    </p:extLst>
+  </p:cSld>
+  <p:clrMapOvr>
+    <a:masterClrMapping/>
+  </p:clrMapOvr>
+</p:sld>
+</file>
+
+<file path=ppt/slides/slide38.xml><?xml version="1.0" encoding="utf-8"?>
+<p:sld xmlns:a="http://schemas.openxmlformats.org/drawingml/2006/main" xmlns:r="http://schemas.openxmlformats.org/officeDocument/2006/relationships" xmlns:p="http://schemas.openxmlformats.org/presentationml/2006/main">
+  <p:cSld>
+    <p:spTree>
+      <p:nvGrpSpPr>
+        <p:cNvPr id="1" name=""/>
+        <p:cNvGrpSpPr/>
+        <p:nvPr/>
+      </p:nvGrpSpPr>
+      <p:grpSpPr>
+        <a:xfrm>
+          <a:off x="0" y="0"/>
+          <a:ext cx="0" cy="0"/>
+          <a:chOff x="0" y="0"/>
+          <a:chExt cx="0" cy="0"/>
+        </a:xfrm>
+      </p:grpSpPr>
+      <p:sp>
+        <p:nvSpPr>
+          <p:cNvPr id="99330" name="Rectangle 2"/>
+          <p:cNvSpPr>
+            <a:spLocks noGrp="1" noChangeArrowheads="1"/>
+          </p:cNvSpPr>
+          <p:nvPr>
+            <p:ph type="title"/>
+          </p:nvPr>
+        </p:nvSpPr>
+        <p:spPr/>
+        <p:txBody>
+          <a:bodyPr/>
+          <a:lstStyle/>
+          <a:p>
+            <a:r>
+              <a:rPr lang="en-US"/>
+              <a:t>Summary</a:t>
+            </a:r>
+          </a:p>
+        </p:txBody>
+      </p:sp>
+      <p:sp>
+        <p:nvSpPr>
+          <p:cNvPr id="99331" name="Rectangle 3"/>
+          <p:cNvSpPr>
+            <a:spLocks noGrp="1" noChangeArrowheads="1"/>
+          </p:cNvSpPr>
+          <p:nvPr>
+            <p:ph idx="1"/>
+          </p:nvPr>
+        </p:nvSpPr>
+        <p:spPr/>
+        <p:txBody>
+          <a:bodyPr/>
+          <a:lstStyle/>
+          <a:p>
+            <a:r>
+              <a:rPr lang="en-US" sz="2100" dirty="0"/>
+              <a:t>Run-time support for functions</a:t>
+            </a:r>
+          </a:p>
+          <a:p>
+            <a:r>
+              <a:rPr lang="en-US" sz="2100" dirty="0"/>
+              <a:t>Dealing with (potentially infinite) recursion</a:t>
+            </a:r>
+          </a:p>
+          <a:p>
+            <a:r>
+              <a:rPr lang="en-US" sz="2100" dirty="0"/>
+              <a:t>Activation records for each function invocation</a:t>
+            </a:r>
+          </a:p>
+          <a:p>
+            <a:r>
+              <a:rPr lang="en-US" sz="2100" dirty="0"/>
+              <a:t>Storage allocation for activation records in recursive function calls</a:t>
+            </a:r>
+          </a:p>
+          <a:p>
+            <a:r>
+              <a:rPr lang="en-US" sz="2100" dirty="0"/>
+              <a:t>Stack allocation is easiest to implement while retaining recursion</a:t>
+            </a:r>
+          </a:p>
+          <a:p>
+            <a:r>
+              <a:rPr lang="en-US" sz="2100" dirty="0"/>
+              <a:t>Functional PLs use heap allocation</a:t>
+            </a:r>
+          </a:p>
+        </p:txBody>
+      </p:sp>
+      <p:sp>
+        <p:nvSpPr>
+          <p:cNvPr id="5" name="Slide Number Placeholder 5"/>
+          <p:cNvSpPr>
+            <a:spLocks noGrp="1"/>
+          </p:cNvSpPr>
+          <p:nvPr>
+            <p:ph type="sldNum" sz="quarter" idx="12"/>
+          </p:nvPr>
+        </p:nvSpPr>
+        <p:spPr/>
+        <p:txBody>
+          <a:bodyPr/>
+          <a:lstStyle/>
+          <a:p>
+            <a:fld id="{57F2DFEC-14F2-6543-828C-982591103638}" type="slidenum">
+              <a:rPr lang="en-US"/>
+              <a:pPr/>
+              <a:t>38</a:t>
+            </a:fld>
+            <a:endParaRPr lang="en-US"/>
+          </a:p>
+        </p:txBody>
+      </p:sp>
+    </p:spTree>
+    <p:extLst>
+      <p:ext uri="{BB962C8B-B14F-4D97-AF65-F5344CB8AC3E}">
+        <p14:creationId xmlns:p14="http://schemas.microsoft.com/office/powerpoint/2010/main" val="781215852"/>
+      </p:ext>
+    </p:extLst>
+  </p:cSld>
+  <p:clrMapOvr>
+    <a:masterClrMapping/>
+  </p:clrMapOvr>
+</p:sld>
+</file>
+
+<file path=ppt/slides/slide39.xml><?xml version="1.0" encoding="utf-8"?>
+<p:sld xmlns:a="http://schemas.openxmlformats.org/drawingml/2006/main" xmlns:r="http://schemas.openxmlformats.org/officeDocument/2006/relationships" xmlns:p="http://schemas.openxmlformats.org/presentationml/2006/main">
+  <p:cSld>
+    <p:spTree>
+      <p:nvGrpSpPr>
+        <p:cNvPr id="1" name=""/>
+        <p:cNvGrpSpPr/>
+        <p:nvPr/>
+      </p:nvGrpSpPr>
+      <p:grpSpPr>
+        <a:xfrm>
+          <a:off x="0" y="0"/>
+          <a:ext cx="0" cy="0"/>
+          <a:chOff x="0" y="0"/>
+          <a:chExt cx="0" cy="0"/>
+        </a:xfrm>
+      </p:grpSpPr>
+      <p:sp>
+        <p:nvSpPr>
+          <p:cNvPr id="2" name="Title 1">
+            <a:extLst>
+              <a:ext uri="{FF2B5EF4-FFF2-40B4-BE49-F238E27FC236}">
+                <a16:creationId xmlns:a16="http://schemas.microsoft.com/office/drawing/2014/main" id="{A9C0F391-9B97-344E-BEBE-477BB5835328}"/>
+              </a:ext>
+            </a:extLst>
+          </p:cNvPr>
+          <p:cNvSpPr>
+            <a:spLocks noGrp="1"/>
+          </p:cNvSpPr>
+          <p:nvPr>
+            <p:ph type="title"/>
+          </p:nvPr>
+        </p:nvSpPr>
+        <p:spPr/>
+        <p:txBody>
+          <a:bodyPr/>
+          <a:lstStyle/>
+          <a:p>
+            <a:r>
+              <a:rPr lang="en-US" dirty="0"/>
+              <a:t>Extra Slides</a:t>
+            </a:r>
+          </a:p>
+        </p:txBody>
+      </p:sp>
+    </p:spTree>
+    <p:extLst>
+      <p:ext uri="{BB962C8B-B14F-4D97-AF65-F5344CB8AC3E}">
+        <p14:creationId xmlns:p14="http://schemas.microsoft.com/office/powerpoint/2010/main" val="4243513599"/>
+      </p:ext>
+    </p:extLst>
+  </p:cSld>
+  <p:clrMapOvr>
+    <a:masterClrMapping/>
+  </p:clrMapOvr>
 </p:sld>
 </file>
 
@@ -31082,433 +30271,6 @@
 </file>
 
 <file path=ppt/slides/slide40.xml><?xml version="1.0" encoding="utf-8"?>
-<p:sld xmlns:a="http://schemas.openxmlformats.org/drawingml/2006/main" xmlns:r="http://schemas.openxmlformats.org/officeDocument/2006/relationships" xmlns:p="http://schemas.openxmlformats.org/presentationml/2006/main">
-  <p:cSld>
-    <p:spTree>
-      <p:nvGrpSpPr>
-        <p:cNvPr id="1" name=""/>
-        <p:cNvGrpSpPr/>
-        <p:nvPr/>
-      </p:nvGrpSpPr>
-      <p:grpSpPr>
-        <a:xfrm>
-          <a:off x="0" y="0"/>
-          <a:ext cx="0" cy="0"/>
-          <a:chOff x="0" y="0"/>
-          <a:chExt cx="0" cy="0"/>
-        </a:xfrm>
-      </p:grpSpPr>
-      <p:sp>
-        <p:nvSpPr>
-          <p:cNvPr id="2" name="Title 1"/>
-          <p:cNvSpPr>
-            <a:spLocks noGrp="1"/>
-          </p:cNvSpPr>
-          <p:nvPr>
-            <p:ph type="title"/>
-          </p:nvPr>
-        </p:nvSpPr>
-        <p:spPr/>
-        <p:txBody>
-          <a:bodyPr/>
-          <a:lstStyle/>
-          <a:p>
-            <a:r>
-              <a:rPr lang="en-CA" dirty="0"/>
-              <a:t>Padding</a:t>
-            </a:r>
-          </a:p>
-        </p:txBody>
-      </p:sp>
-      <p:sp>
-        <p:nvSpPr>
-          <p:cNvPr id="3" name="Content Placeholder 2"/>
-          <p:cNvSpPr>
-            <a:spLocks noGrp="1"/>
-          </p:cNvSpPr>
-          <p:nvPr>
-            <p:ph idx="1"/>
-          </p:nvPr>
-        </p:nvSpPr>
-        <p:spPr/>
-        <p:txBody>
-          <a:bodyPr/>
-          <a:lstStyle/>
-          <a:p>
-            <a:r>
-              <a:rPr lang="en-CA" dirty="0"/>
-              <a:t>Compilers may insert unused bytes called "padding bytes" after structure members to ensure that each member is appropriately aligned.</a:t>
-            </a:r>
-          </a:p>
-          <a:p>
-            <a:pPr marL="685800" lvl="2" indent="0">
-              <a:buNone/>
-            </a:pPr>
-            <a:r>
-              <a:rPr lang="en-CA" dirty="0" err="1">
-                <a:latin typeface="Consolas" panose="020B0609020204030204" pitchFamily="49" charset="0"/>
-                <a:cs typeface="Consolas" panose="020B0609020204030204" pitchFamily="49" charset="0"/>
-              </a:rPr>
-              <a:t>struct</a:t>
-            </a:r>
-            <a:r>
-              <a:rPr lang="en-CA" dirty="0">
-                <a:latin typeface="Consolas" panose="020B0609020204030204" pitchFamily="49" charset="0"/>
-                <a:cs typeface="Consolas" panose="020B0609020204030204" pitchFamily="49" charset="0"/>
-              </a:rPr>
-              <a:t> widget {</a:t>
-            </a:r>
-          </a:p>
-          <a:p>
-            <a:pPr marL="685800" lvl="2" indent="0">
-              <a:buNone/>
-            </a:pPr>
-            <a:r>
-              <a:rPr lang="en-CA" dirty="0">
-                <a:latin typeface="Consolas" panose="020B0609020204030204" pitchFamily="49" charset="0"/>
-                <a:cs typeface="Consolas" panose="020B0609020204030204" pitchFamily="49" charset="0"/>
-              </a:rPr>
-              <a:t>    char m1;</a:t>
-            </a:r>
-          </a:p>
-          <a:p>
-            <a:pPr marL="685800" lvl="2" indent="0">
-              <a:buNone/>
-            </a:pPr>
-            <a:r>
-              <a:rPr lang="en-CA" dirty="0">
-                <a:latin typeface="Consolas" panose="020B0609020204030204" pitchFamily="49" charset="0"/>
-                <a:cs typeface="Consolas" panose="020B0609020204030204" pitchFamily="49" charset="0"/>
-              </a:rPr>
-              <a:t>    </a:t>
-            </a:r>
-            <a:r>
-              <a:rPr lang="en-CA" dirty="0" err="1">
-                <a:latin typeface="Consolas" panose="020B0609020204030204" pitchFamily="49" charset="0"/>
-                <a:cs typeface="Consolas" panose="020B0609020204030204" pitchFamily="49" charset="0"/>
-              </a:rPr>
-              <a:t>int</a:t>
-            </a:r>
-            <a:r>
-              <a:rPr lang="en-CA" dirty="0">
-                <a:latin typeface="Consolas" panose="020B0609020204030204" pitchFamily="49" charset="0"/>
-                <a:cs typeface="Consolas" panose="020B0609020204030204" pitchFamily="49" charset="0"/>
-              </a:rPr>
-              <a:t> m2;</a:t>
-            </a:r>
-          </a:p>
-          <a:p>
-            <a:pPr marL="685800" lvl="2" indent="0">
-              <a:buNone/>
-            </a:pPr>
-            <a:r>
-              <a:rPr lang="en-CA" dirty="0">
-                <a:latin typeface="Consolas" panose="020B0609020204030204" pitchFamily="49" charset="0"/>
-                <a:cs typeface="Consolas" panose="020B0609020204030204" pitchFamily="49" charset="0"/>
-              </a:rPr>
-              <a:t>    char m3;</a:t>
-            </a:r>
-          </a:p>
-          <a:p>
-            <a:pPr marL="685800" lvl="2" indent="0">
-              <a:buNone/>
-            </a:pPr>
-            <a:r>
-              <a:rPr lang="en-CA" dirty="0">
-                <a:latin typeface="Consolas" panose="020B0609020204030204" pitchFamily="49" charset="0"/>
-                <a:cs typeface="Consolas" panose="020B0609020204030204" pitchFamily="49" charset="0"/>
-              </a:rPr>
-              <a:t>};</a:t>
-            </a:r>
-          </a:p>
-          <a:p>
-            <a:pPr marL="342900" lvl="1" indent="0">
-              <a:buNone/>
-            </a:pPr>
-            <a:endParaRPr lang="en-CA" dirty="0"/>
-          </a:p>
-        </p:txBody>
-      </p:sp>
-      <p:sp>
-        <p:nvSpPr>
-          <p:cNvPr id="5" name="Slide Number Placeholder 4"/>
-          <p:cNvSpPr>
-            <a:spLocks noGrp="1"/>
-          </p:cNvSpPr>
-          <p:nvPr>
-            <p:ph type="sldNum" sz="quarter" idx="12"/>
-          </p:nvPr>
-        </p:nvSpPr>
-        <p:spPr/>
-        <p:txBody>
-          <a:bodyPr/>
-          <a:lstStyle/>
-          <a:p>
-            <a:fld id="{EFA508D8-6740-FE46-95CC-F1012A7A27C5}" type="slidenum">
-              <a:rPr lang="en-US" smtClean="0"/>
-              <a:pPr/>
-              <a:t>40</a:t>
-            </a:fld>
-            <a:endParaRPr lang="en-US"/>
-          </a:p>
-        </p:txBody>
-      </p:sp>
-      <p:sp>
-        <p:nvSpPr>
-          <p:cNvPr id="6" name="TextBox 5"/>
-          <p:cNvSpPr txBox="1"/>
-          <p:nvPr/>
-        </p:nvSpPr>
-        <p:spPr>
-          <a:xfrm>
-            <a:off x="4301970" y="3291683"/>
-            <a:ext cx="3024336" cy="923330"/>
-          </a:xfrm>
-          <a:prstGeom prst="rect">
-            <a:avLst/>
-          </a:prstGeom>
-          <a:noFill/>
-        </p:spPr>
-        <p:txBody>
-          <a:bodyPr wrap="square" rtlCol="0">
-            <a:spAutoFit/>
-          </a:bodyPr>
-          <a:lstStyle/>
-          <a:p>
-            <a:r>
-              <a:rPr lang="en-CA" sz="1800" dirty="0">
-                <a:solidFill>
-                  <a:schemeClr val="accent2"/>
-                </a:solidFill>
-                <a:latin typeface="Calibri" panose="020F0502020204030204" pitchFamily="34" charset="0"/>
-              </a:rPr>
-              <a:t>On a word aligned machine:</a:t>
-            </a:r>
-          </a:p>
-          <a:p>
-            <a:r>
-              <a:rPr lang="en-CA" sz="1800" dirty="0">
-                <a:solidFill>
-                  <a:schemeClr val="accent2"/>
-                </a:solidFill>
-                <a:latin typeface="Calibri" panose="020F0502020204030204" pitchFamily="34" charset="0"/>
-              </a:rPr>
-              <a:t>add 3 bytes of padding </a:t>
-            </a:r>
-          </a:p>
-          <a:p>
-            <a:r>
-              <a:rPr lang="en-CA" sz="1800" dirty="0">
-                <a:solidFill>
-                  <a:schemeClr val="accent2"/>
-                </a:solidFill>
-                <a:latin typeface="Calibri" panose="020F0502020204030204" pitchFamily="34" charset="0"/>
-              </a:rPr>
-              <a:t>after m1 and m3</a:t>
-            </a:r>
-          </a:p>
-        </p:txBody>
-      </p:sp>
-    </p:spTree>
-    <p:extLst>
-      <p:ext uri="{BB962C8B-B14F-4D97-AF65-F5344CB8AC3E}">
-        <p14:creationId xmlns:p14="http://schemas.microsoft.com/office/powerpoint/2010/main" val="2312361512"/>
-      </p:ext>
-    </p:extLst>
-  </p:cSld>
-  <p:clrMapOvr>
-    <a:masterClrMapping/>
-  </p:clrMapOvr>
-</p:sld>
-</file>
-
-<file path=ppt/slides/slide41.xml><?xml version="1.0" encoding="utf-8"?>
-<p:sld xmlns:a="http://schemas.openxmlformats.org/drawingml/2006/main" xmlns:r="http://schemas.openxmlformats.org/officeDocument/2006/relationships" xmlns:p="http://schemas.openxmlformats.org/presentationml/2006/main">
-  <p:cSld>
-    <p:spTree>
-      <p:nvGrpSpPr>
-        <p:cNvPr id="1" name=""/>
-        <p:cNvGrpSpPr/>
-        <p:nvPr/>
-      </p:nvGrpSpPr>
-      <p:grpSpPr>
-        <a:xfrm>
-          <a:off x="0" y="0"/>
-          <a:ext cx="0" cy="0"/>
-          <a:chOff x="0" y="0"/>
-          <a:chExt cx="0" cy="0"/>
-        </a:xfrm>
-      </p:grpSpPr>
-      <p:sp>
-        <p:nvSpPr>
-          <p:cNvPr id="99330" name="Rectangle 2"/>
-          <p:cNvSpPr>
-            <a:spLocks noGrp="1" noChangeArrowheads="1"/>
-          </p:cNvSpPr>
-          <p:nvPr>
-            <p:ph type="title"/>
-          </p:nvPr>
-        </p:nvSpPr>
-        <p:spPr/>
-        <p:txBody>
-          <a:bodyPr/>
-          <a:lstStyle/>
-          <a:p>
-            <a:r>
-              <a:rPr lang="en-US"/>
-              <a:t>Summary</a:t>
-            </a:r>
-          </a:p>
-        </p:txBody>
-      </p:sp>
-      <p:sp>
-        <p:nvSpPr>
-          <p:cNvPr id="99331" name="Rectangle 3"/>
-          <p:cNvSpPr>
-            <a:spLocks noGrp="1" noChangeArrowheads="1"/>
-          </p:cNvSpPr>
-          <p:nvPr>
-            <p:ph idx="1"/>
-          </p:nvPr>
-        </p:nvSpPr>
-        <p:spPr/>
-        <p:txBody>
-          <a:bodyPr/>
-          <a:lstStyle/>
-          <a:p>
-            <a:r>
-              <a:rPr lang="en-US" sz="2100" dirty="0"/>
-              <a:t>Run-time support for functions</a:t>
-            </a:r>
-          </a:p>
-          <a:p>
-            <a:r>
-              <a:rPr lang="en-US" sz="2100" dirty="0"/>
-              <a:t>Dealing with (potentially infinite) recursion</a:t>
-            </a:r>
-          </a:p>
-          <a:p>
-            <a:r>
-              <a:rPr lang="en-US" sz="2100" dirty="0"/>
-              <a:t>Activation records for each function invocation</a:t>
-            </a:r>
-          </a:p>
-          <a:p>
-            <a:r>
-              <a:rPr lang="en-US" sz="2100" dirty="0"/>
-              <a:t>Storage allocation for activation records in recursive function calls</a:t>
-            </a:r>
-          </a:p>
-          <a:p>
-            <a:r>
-              <a:rPr lang="en-US" sz="2100" dirty="0"/>
-              <a:t>Stack allocation is easiest to implement while retaining recursion</a:t>
-            </a:r>
-          </a:p>
-          <a:p>
-            <a:r>
-              <a:rPr lang="en-US" sz="2100" dirty="0"/>
-              <a:t>Functional PLs use heap allocation</a:t>
-            </a:r>
-          </a:p>
-        </p:txBody>
-      </p:sp>
-      <p:sp>
-        <p:nvSpPr>
-          <p:cNvPr id="5" name="Slide Number Placeholder 5"/>
-          <p:cNvSpPr>
-            <a:spLocks noGrp="1"/>
-          </p:cNvSpPr>
-          <p:nvPr>
-            <p:ph type="sldNum" sz="quarter" idx="12"/>
-          </p:nvPr>
-        </p:nvSpPr>
-        <p:spPr/>
-        <p:txBody>
-          <a:bodyPr/>
-          <a:lstStyle/>
-          <a:p>
-            <a:fld id="{57F2DFEC-14F2-6543-828C-982591103638}" type="slidenum">
-              <a:rPr lang="en-US"/>
-              <a:pPr/>
-              <a:t>41</a:t>
-            </a:fld>
-            <a:endParaRPr lang="en-US"/>
-          </a:p>
-        </p:txBody>
-      </p:sp>
-    </p:spTree>
-    <p:extLst>
-      <p:ext uri="{BB962C8B-B14F-4D97-AF65-F5344CB8AC3E}">
-        <p14:creationId xmlns:p14="http://schemas.microsoft.com/office/powerpoint/2010/main" val="781215852"/>
-      </p:ext>
-    </p:extLst>
-  </p:cSld>
-  <p:clrMapOvr>
-    <a:masterClrMapping/>
-  </p:clrMapOvr>
-</p:sld>
-</file>
-
-<file path=ppt/slides/slide42.xml><?xml version="1.0" encoding="utf-8"?>
-<p:sld xmlns:a="http://schemas.openxmlformats.org/drawingml/2006/main" xmlns:r="http://schemas.openxmlformats.org/officeDocument/2006/relationships" xmlns:p="http://schemas.openxmlformats.org/presentationml/2006/main">
-  <p:cSld>
-    <p:spTree>
-      <p:nvGrpSpPr>
-        <p:cNvPr id="1" name=""/>
-        <p:cNvGrpSpPr/>
-        <p:nvPr/>
-      </p:nvGrpSpPr>
-      <p:grpSpPr>
-        <a:xfrm>
-          <a:off x="0" y="0"/>
-          <a:ext cx="0" cy="0"/>
-          <a:chOff x="0" y="0"/>
-          <a:chExt cx="0" cy="0"/>
-        </a:xfrm>
-      </p:grpSpPr>
-      <p:sp>
-        <p:nvSpPr>
-          <p:cNvPr id="2" name="Title 1">
-            <a:extLst>
-              <a:ext uri="{FF2B5EF4-FFF2-40B4-BE49-F238E27FC236}">
-                <a16:creationId xmlns:a16="http://schemas.microsoft.com/office/drawing/2014/main" id="{A9C0F391-9B97-344E-BEBE-477BB5835328}"/>
-              </a:ext>
-            </a:extLst>
-          </p:cNvPr>
-          <p:cNvSpPr>
-            <a:spLocks noGrp="1"/>
-          </p:cNvSpPr>
-          <p:nvPr>
-            <p:ph type="title"/>
-          </p:nvPr>
-        </p:nvSpPr>
-        <p:spPr/>
-        <p:txBody>
-          <a:bodyPr/>
-          <a:lstStyle/>
-          <a:p>
-            <a:r>
-              <a:rPr lang="en-US" dirty="0"/>
-              <a:t>Extra Slides</a:t>
-            </a:r>
-          </a:p>
-        </p:txBody>
-      </p:sp>
-    </p:spTree>
-    <p:extLst>
-      <p:ext uri="{BB962C8B-B14F-4D97-AF65-F5344CB8AC3E}">
-        <p14:creationId xmlns:p14="http://schemas.microsoft.com/office/powerpoint/2010/main" val="4243513599"/>
-      </p:ext>
-    </p:extLst>
-  </p:cSld>
-  <p:clrMapOvr>
-    <a:masterClrMapping/>
-  </p:clrMapOvr>
-</p:sld>
-</file>
-
-<file path=ppt/slides/slide43.xml><?xml version="1.0" encoding="utf-8"?>
 <p:sld xmlns:a="http://schemas.openxmlformats.org/drawingml/2006/main" xmlns:r="http://schemas.openxmlformats.org/officeDocument/2006/relationships" xmlns:p="http://schemas.openxmlformats.org/presentationml/2006/main" showMasterPhAnim="0">
   <p:cSld>
     <p:spTree>
@@ -31643,7 +30405,7 @@
             <a:fld id="{7325C795-7DAB-B442-B639-80218F73E84D}" type="slidenum">
               <a:rPr lang="en-US"/>
               <a:pPr/>
-              <a:t>43</a:t>
+              <a:t>40</a:t>
             </a:fld>
             <a:endParaRPr lang="en-US"/>
           </a:p>
@@ -31935,7 +30697,7 @@
 </p:sld>
 </file>
 
-<file path=ppt/slides/slide44.xml><?xml version="1.0" encoding="utf-8"?>
+<file path=ppt/slides/slide41.xml><?xml version="1.0" encoding="utf-8"?>
 <p:sld xmlns:a="http://schemas.openxmlformats.org/drawingml/2006/main" xmlns:r="http://schemas.openxmlformats.org/officeDocument/2006/relationships" xmlns:p="http://schemas.openxmlformats.org/presentationml/2006/main" showMasterPhAnim="0">
   <p:cSld>
     <p:spTree>
@@ -32056,7 +30818,7 @@
             <a:fld id="{FA10C18A-94F5-2042-80F6-19625B7C0DC1}" type="slidenum">
               <a:rPr lang="en-US"/>
               <a:pPr/>
-              <a:t>44</a:t>
+              <a:t>41</a:t>
             </a:fld>
             <a:endParaRPr lang="en-US"/>
           </a:p>
@@ -32397,7 +31159,7 @@
 </p:sld>
 </file>
 
-<file path=ppt/slides/slide45.xml><?xml version="1.0" encoding="utf-8"?>
+<file path=ppt/slides/slide42.xml><?xml version="1.0" encoding="utf-8"?>
 <p:sld xmlns:a="http://schemas.openxmlformats.org/drawingml/2006/main" xmlns:r="http://schemas.openxmlformats.org/officeDocument/2006/relationships" xmlns:p="http://schemas.openxmlformats.org/presentationml/2006/main" showMasterPhAnim="0">
   <p:cSld>
     <p:spTree>
@@ -32525,7 +31287,7 @@
             <a:fld id="{981EF993-54B0-C34A-8C1A-2BD3CF04B331}" type="slidenum">
               <a:rPr lang="en-US"/>
               <a:pPr/>
-              <a:t>45</a:t>
+              <a:t>42</a:t>
             </a:fld>
             <a:endParaRPr lang="en-US"/>
           </a:p>
@@ -32817,7 +31579,7 @@
 </p:sld>
 </file>
 
-<file path=ppt/slides/slide46.xml><?xml version="1.0" encoding="utf-8"?>
+<file path=ppt/slides/slide43.xml><?xml version="1.0" encoding="utf-8"?>
 <p:sld xmlns:a="http://schemas.openxmlformats.org/drawingml/2006/main" xmlns:r="http://schemas.openxmlformats.org/officeDocument/2006/relationships" xmlns:p="http://schemas.openxmlformats.org/presentationml/2006/main">
   <p:cSld>
     <p:spTree>
@@ -33159,7 +31921,7 @@
             <a:fld id="{065D022C-57C6-3245-B0A5-C2956BEBABCC}" type="slidenum">
               <a:rPr lang="en-US"/>
               <a:pPr/>
-              <a:t>46</a:t>
+              <a:t>43</a:t>
             </a:fld>
             <a:endParaRPr lang="en-US"/>
           </a:p>
@@ -33173,7 +31935,7 @@
 </p:sld>
 </file>
 
-<file path=ppt/slides/slide47.xml><?xml version="1.0" encoding="utf-8"?>
+<file path=ppt/slides/slide44.xml><?xml version="1.0" encoding="utf-8"?>
 <p:sld xmlns:a="http://schemas.openxmlformats.org/drawingml/2006/main" xmlns:r="http://schemas.openxmlformats.org/officeDocument/2006/relationships" xmlns:p="http://schemas.openxmlformats.org/presentationml/2006/main" showMasterPhAnim="0">
   <p:cSld>
     <p:spTree>
@@ -33385,7 +32147,7 @@
             <a:fld id="{1FF25E63-21E9-EF4B-9E1D-2B243800535E}" type="slidenum">
               <a:rPr lang="en-US"/>
               <a:pPr/>
-              <a:t>47</a:t>
+              <a:t>44</a:t>
             </a:fld>
             <a:endParaRPr lang="en-US"/>
           </a:p>
@@ -34164,6 +32926,1246 @@
 </p:sld>
 </file>
 
+<file path=ppt/slides/slide45.xml><?xml version="1.0" encoding="utf-8"?>
+<p:sld xmlns:a="http://schemas.openxmlformats.org/drawingml/2006/main" xmlns:r="http://schemas.openxmlformats.org/officeDocument/2006/relationships" xmlns:p="http://schemas.openxmlformats.org/presentationml/2006/main">
+  <p:cSld>
+    <p:spTree>
+      <p:nvGrpSpPr>
+        <p:cNvPr id="1" name=""/>
+        <p:cNvGrpSpPr/>
+        <p:nvPr/>
+      </p:nvGrpSpPr>
+      <p:grpSpPr>
+        <a:xfrm>
+          <a:off x="0" y="0"/>
+          <a:ext cx="0" cy="0"/>
+          <a:chOff x="0" y="0"/>
+          <a:chExt cx="0" cy="0"/>
+        </a:xfrm>
+      </p:grpSpPr>
+      <p:sp>
+        <p:nvSpPr>
+          <p:cNvPr id="87042" name="Rectangle 2"/>
+          <p:cNvSpPr>
+            <a:spLocks noGrp="1" noChangeArrowheads="1"/>
+          </p:cNvSpPr>
+          <p:nvPr>
+            <p:ph type="title"/>
+          </p:nvPr>
+        </p:nvSpPr>
+        <p:spPr/>
+        <p:txBody>
+          <a:bodyPr/>
+          <a:lstStyle/>
+          <a:p>
+            <a:r>
+              <a:rPr lang="en-US" dirty="0"/>
+              <a:t>MIPS Stack frame</a:t>
+            </a:r>
+          </a:p>
+        </p:txBody>
+      </p:sp>
+      <p:sp>
+        <p:nvSpPr>
+          <p:cNvPr id="5" name="Slide Number Placeholder 4"/>
+          <p:cNvSpPr>
+            <a:spLocks noGrp="1"/>
+          </p:cNvSpPr>
+          <p:nvPr>
+            <p:ph type="sldNum" sz="quarter" idx="12"/>
+          </p:nvPr>
+        </p:nvSpPr>
+        <p:spPr/>
+        <p:txBody>
+          <a:bodyPr/>
+          <a:lstStyle/>
+          <a:p>
+            <a:fld id="{8A393549-EAF5-6541-9573-246DD75762A5}" type="slidenum">
+              <a:rPr lang="en-US"/>
+              <a:pPr/>
+              <a:t>45</a:t>
+            </a:fld>
+            <a:endParaRPr lang="en-US"/>
+          </a:p>
+        </p:txBody>
+      </p:sp>
+      <p:pic>
+        <p:nvPicPr>
+          <p:cNvPr id="87044" name="Picture 4"/>
+          <p:cNvPicPr>
+            <a:picLocks noChangeAspect="1" noChangeArrowheads="1"/>
+          </p:cNvPicPr>
+          <p:nvPr/>
+        </p:nvPicPr>
+        <p:blipFill>
+          <a:blip r:embed="rId3"/>
+          <a:srcRect/>
+          <a:stretch>
+            <a:fillRect/>
+          </a:stretch>
+        </p:blipFill>
+        <p:spPr bwMode="auto">
+          <a:xfrm>
+            <a:off x="2171700" y="1143000"/>
+            <a:ext cx="4972050" cy="3873104"/>
+          </a:xfrm>
+          <a:prstGeom prst="rect">
+            <a:avLst/>
+          </a:prstGeom>
+          <a:noFill/>
+          <a:ln w="9525">
+            <a:noFill/>
+            <a:miter lim="800000"/>
+            <a:headEnd/>
+            <a:tailEnd/>
+          </a:ln>
+          <a:effectLst/>
+        </p:spPr>
+      </p:pic>
+      <p:sp>
+        <p:nvSpPr>
+          <p:cNvPr id="6" name="Rounded Rectangular Callout 5"/>
+          <p:cNvSpPr/>
+          <p:nvPr/>
+        </p:nvSpPr>
+        <p:spPr bwMode="auto">
+          <a:xfrm>
+            <a:off x="1314450" y="1657350"/>
+            <a:ext cx="1485900" cy="457200"/>
+          </a:xfrm>
+          <a:prstGeom prst="wedgeRoundRectCallout">
+            <a:avLst>
+              <a:gd name="adj1" fmla="val 28965"/>
+              <a:gd name="adj2" fmla="val 69220"/>
+              <a:gd name="adj3" fmla="val 16667"/>
+            </a:avLst>
+          </a:prstGeom>
+          <a:solidFill>
+            <a:schemeClr val="accent5">
+              <a:lumMod val="40000"/>
+              <a:lumOff val="60000"/>
+            </a:schemeClr>
+          </a:solidFill>
+          <a:ln w="9525" cap="flat" cmpd="sng" algn="ctr">
+            <a:solidFill>
+              <a:schemeClr val="tx1"/>
+            </a:solidFill>
+            <a:prstDash val="solid"/>
+            <a:round/>
+            <a:headEnd type="none" w="med" len="med"/>
+            <a:tailEnd type="none" w="med" len="med"/>
+          </a:ln>
+          <a:effectLst/>
+        </p:spPr>
+        <p:txBody>
+          <a:bodyPr vert="horz" wrap="square" lIns="68580" tIns="34290" rIns="68580" bIns="34290" numCol="1" rtlCol="0" anchor="t" anchorCtr="0" compatLnSpc="1">
+            <a:prstTxWarp prst="textNoShape">
+              <a:avLst/>
+            </a:prstTxWarp>
+            <a:normAutofit fontScale="92500"/>
+          </a:bodyPr>
+          <a:lstStyle/>
+          <a:p>
+            <a:pPr defTabSz="685800"/>
+            <a:r>
+              <a:rPr lang="en-US" sz="1800" dirty="0">
+                <a:latin typeface="Calibri" panose="020F0502020204030204" pitchFamily="34" charset="0"/>
+              </a:rPr>
+              <a:t>Frame pointer</a:t>
+            </a:r>
+          </a:p>
+        </p:txBody>
+      </p:sp>
+      <p:sp>
+        <p:nvSpPr>
+          <p:cNvPr id="7" name="Rounded Rectangular Callout 6"/>
+          <p:cNvSpPr/>
+          <p:nvPr/>
+        </p:nvSpPr>
+        <p:spPr bwMode="auto">
+          <a:xfrm>
+            <a:off x="1314450" y="4114800"/>
+            <a:ext cx="1485900" cy="457200"/>
+          </a:xfrm>
+          <a:prstGeom prst="wedgeRoundRectCallout">
+            <a:avLst>
+              <a:gd name="adj1" fmla="val 28965"/>
+              <a:gd name="adj2" fmla="val 69220"/>
+              <a:gd name="adj3" fmla="val 16667"/>
+            </a:avLst>
+          </a:prstGeom>
+          <a:solidFill>
+            <a:schemeClr val="accent5">
+              <a:lumMod val="40000"/>
+              <a:lumOff val="60000"/>
+            </a:schemeClr>
+          </a:solidFill>
+          <a:ln w="9525" cap="flat" cmpd="sng" algn="ctr">
+            <a:solidFill>
+              <a:schemeClr val="tx1"/>
+            </a:solidFill>
+            <a:prstDash val="solid"/>
+            <a:round/>
+            <a:headEnd type="none" w="med" len="med"/>
+            <a:tailEnd type="none" w="med" len="med"/>
+          </a:ln>
+          <a:effectLst/>
+        </p:spPr>
+        <p:txBody>
+          <a:bodyPr vert="horz" wrap="square" lIns="68580" tIns="34290" rIns="68580" bIns="34290" numCol="1" rtlCol="0" anchor="t" anchorCtr="0" compatLnSpc="1">
+            <a:prstTxWarp prst="textNoShape">
+              <a:avLst/>
+            </a:prstTxWarp>
+            <a:normAutofit/>
+          </a:bodyPr>
+          <a:lstStyle/>
+          <a:p>
+            <a:pPr defTabSz="685800"/>
+            <a:r>
+              <a:rPr lang="en-US" sz="1800" dirty="0">
+                <a:latin typeface="Calibri" panose="020F0502020204030204" pitchFamily="34" charset="0"/>
+              </a:rPr>
+              <a:t>Stack pointer</a:t>
+            </a:r>
+          </a:p>
+        </p:txBody>
+      </p:sp>
+      <p:sp>
+        <p:nvSpPr>
+          <p:cNvPr id="8" name="Rounded Rectangular Callout 7"/>
+          <p:cNvSpPr/>
+          <p:nvPr/>
+        </p:nvSpPr>
+        <p:spPr bwMode="auto">
+          <a:xfrm>
+            <a:off x="5143500" y="1761660"/>
+            <a:ext cx="2514600" cy="1314450"/>
+          </a:xfrm>
+          <a:prstGeom prst="wedgeRoundRectCallout">
+            <a:avLst>
+              <a:gd name="adj1" fmla="val -61567"/>
+              <a:gd name="adj2" fmla="val -20174"/>
+              <a:gd name="adj3" fmla="val 16667"/>
+            </a:avLst>
+          </a:prstGeom>
+          <a:solidFill>
+            <a:schemeClr val="accent5">
+              <a:lumMod val="40000"/>
+              <a:lumOff val="60000"/>
+            </a:schemeClr>
+          </a:solidFill>
+          <a:ln w="9525" cap="flat" cmpd="sng" algn="ctr">
+            <a:solidFill>
+              <a:schemeClr val="tx1"/>
+            </a:solidFill>
+            <a:prstDash val="solid"/>
+            <a:round/>
+            <a:headEnd type="none" w="med" len="med"/>
+            <a:tailEnd type="none" w="med" len="med"/>
+          </a:ln>
+          <a:effectLst/>
+        </p:spPr>
+        <p:txBody>
+          <a:bodyPr vert="horz" wrap="square" lIns="68580" tIns="34290" rIns="68580" bIns="34290" numCol="1" rtlCol="0" anchor="t" anchorCtr="0" compatLnSpc="1">
+            <a:prstTxWarp prst="textNoShape">
+              <a:avLst/>
+            </a:prstTxWarp>
+            <a:normAutofit/>
+          </a:bodyPr>
+          <a:lstStyle/>
+          <a:p>
+            <a:pPr defTabSz="685800"/>
+            <a:r>
+              <a:rPr lang="en-US" sz="1800" dirty="0">
+                <a:latin typeface="Calibri" panose="020F0502020204030204" pitchFamily="34" charset="0"/>
+              </a:rPr>
+              <a:t>In MIPS, Argument 1-4 are provided to the function in registers $a0-$a3</a:t>
+            </a:r>
+          </a:p>
+        </p:txBody>
+      </p:sp>
+      <p:sp>
+        <p:nvSpPr>
+          <p:cNvPr id="9" name="Rounded Rectangular Callout 8"/>
+          <p:cNvSpPr/>
+          <p:nvPr/>
+        </p:nvSpPr>
+        <p:spPr bwMode="auto">
+          <a:xfrm>
+            <a:off x="5926956" y="3597865"/>
+            <a:ext cx="1615375" cy="594065"/>
+          </a:xfrm>
+          <a:prstGeom prst="wedgeRoundRectCallout">
+            <a:avLst>
+              <a:gd name="adj1" fmla="val -62230"/>
+              <a:gd name="adj2" fmla="val -56250"/>
+              <a:gd name="adj3" fmla="val 16667"/>
+            </a:avLst>
+          </a:prstGeom>
+          <a:solidFill>
+            <a:schemeClr val="accent5">
+              <a:lumMod val="40000"/>
+              <a:lumOff val="60000"/>
+            </a:schemeClr>
+          </a:solidFill>
+          <a:ln w="9525" cap="flat" cmpd="sng" algn="ctr">
+            <a:solidFill>
+              <a:schemeClr val="tx1"/>
+            </a:solidFill>
+            <a:prstDash val="solid"/>
+            <a:round/>
+            <a:headEnd type="none" w="med" len="med"/>
+            <a:tailEnd type="none" w="med" len="med"/>
+          </a:ln>
+          <a:effectLst/>
+        </p:spPr>
+        <p:txBody>
+          <a:bodyPr vert="horz" wrap="square" lIns="68580" tIns="34290" rIns="68580" bIns="34290" numCol="1" rtlCol="0" anchor="t" anchorCtr="0" compatLnSpc="1">
+            <a:prstTxWarp prst="textNoShape">
+              <a:avLst/>
+            </a:prstTxWarp>
+            <a:normAutofit fontScale="92500" lnSpcReduction="10000"/>
+          </a:bodyPr>
+          <a:lstStyle/>
+          <a:p>
+            <a:pPr defTabSz="685800"/>
+            <a:r>
+              <a:rPr lang="en-US" sz="1800" dirty="0">
+                <a:latin typeface="Calibri" panose="020F0502020204030204" pitchFamily="34" charset="0"/>
+              </a:rPr>
+              <a:t>Return address in $</a:t>
+            </a:r>
+            <a:r>
+              <a:rPr lang="en-US" sz="1800" dirty="0" err="1">
+                <a:latin typeface="Calibri" panose="020F0502020204030204" pitchFamily="34" charset="0"/>
+              </a:rPr>
+              <a:t>ra</a:t>
+            </a:r>
+            <a:endParaRPr lang="en-US" sz="1800" dirty="0">
+              <a:latin typeface="Calibri" panose="020F0502020204030204" pitchFamily="34" charset="0"/>
+            </a:endParaRPr>
+          </a:p>
+        </p:txBody>
+      </p:sp>
+    </p:spTree>
+    <p:extLst>
+      <p:ext uri="{BB962C8B-B14F-4D97-AF65-F5344CB8AC3E}">
+        <p14:creationId xmlns:p14="http://schemas.microsoft.com/office/powerpoint/2010/main" val="561117814"/>
+      </p:ext>
+    </p:extLst>
+  </p:cSld>
+  <p:clrMapOvr>
+    <a:masterClrMapping/>
+  </p:clrMapOvr>
+  <p:timing>
+    <p:tnLst>
+      <p:par>
+        <p:cTn id="1" dur="indefinite" restart="never" nodeType="tmRoot">
+          <p:childTnLst>
+            <p:seq concurrent="1" nextAc="seek">
+              <p:cTn id="2" dur="indefinite" nodeType="mainSeq">
+                <p:childTnLst>
+                  <p:par>
+                    <p:cTn id="3" fill="hold">
+                      <p:stCondLst>
+                        <p:cond delay="indefinite"/>
+                      </p:stCondLst>
+                      <p:childTnLst>
+                        <p:par>
+                          <p:cTn id="4" fill="hold">
+                            <p:stCondLst>
+                              <p:cond delay="0"/>
+                            </p:stCondLst>
+                            <p:childTnLst>
+                              <p:par>
+                                <p:cTn id="5" presetID="1" presetClass="entr" presetSubtype="0" fill="hold" grpId="0" nodeType="clickEffect">
+                                  <p:stCondLst>
+                                    <p:cond delay="0"/>
+                                  </p:stCondLst>
+                                  <p:childTnLst>
+                                    <p:set>
+                                      <p:cBhvr>
+                                        <p:cTn id="6" dur="1" fill="hold">
+                                          <p:stCondLst>
+                                            <p:cond delay="0"/>
+                                          </p:stCondLst>
+                                        </p:cTn>
+                                        <p:tgtEl>
+                                          <p:spTgt spid="6"/>
+                                        </p:tgtEl>
+                                        <p:attrNameLst>
+                                          <p:attrName>style.visibility</p:attrName>
+                                        </p:attrNameLst>
+                                      </p:cBhvr>
+                                      <p:to>
+                                        <p:strVal val="visible"/>
+                                      </p:to>
+                                    </p:set>
+                                  </p:childTnLst>
+                                </p:cTn>
+                              </p:par>
+                            </p:childTnLst>
+                          </p:cTn>
+                        </p:par>
+                      </p:childTnLst>
+                    </p:cTn>
+                  </p:par>
+                  <p:par>
+                    <p:cTn id="7" fill="hold">
+                      <p:stCondLst>
+                        <p:cond delay="indefinite"/>
+                      </p:stCondLst>
+                      <p:childTnLst>
+                        <p:par>
+                          <p:cTn id="8" fill="hold">
+                            <p:stCondLst>
+                              <p:cond delay="0"/>
+                            </p:stCondLst>
+                            <p:childTnLst>
+                              <p:par>
+                                <p:cTn id="9" presetID="1" presetClass="entr" presetSubtype="0" fill="hold" grpId="0" nodeType="clickEffect">
+                                  <p:stCondLst>
+                                    <p:cond delay="0"/>
+                                  </p:stCondLst>
+                                  <p:childTnLst>
+                                    <p:set>
+                                      <p:cBhvr>
+                                        <p:cTn id="10" dur="1" fill="hold">
+                                          <p:stCondLst>
+                                            <p:cond delay="0"/>
+                                          </p:stCondLst>
+                                        </p:cTn>
+                                        <p:tgtEl>
+                                          <p:spTgt spid="7"/>
+                                        </p:tgtEl>
+                                        <p:attrNameLst>
+                                          <p:attrName>style.visibility</p:attrName>
+                                        </p:attrNameLst>
+                                      </p:cBhvr>
+                                      <p:to>
+                                        <p:strVal val="visible"/>
+                                      </p:to>
+                                    </p:set>
+                                  </p:childTnLst>
+                                </p:cTn>
+                              </p:par>
+                            </p:childTnLst>
+                          </p:cTn>
+                        </p:par>
+                      </p:childTnLst>
+                    </p:cTn>
+                  </p:par>
+                  <p:par>
+                    <p:cTn id="11" fill="hold">
+                      <p:stCondLst>
+                        <p:cond delay="indefinite"/>
+                      </p:stCondLst>
+                      <p:childTnLst>
+                        <p:par>
+                          <p:cTn id="12" fill="hold">
+                            <p:stCondLst>
+                              <p:cond delay="0"/>
+                            </p:stCondLst>
+                            <p:childTnLst>
+                              <p:par>
+                                <p:cTn id="13" presetID="1" presetClass="entr" presetSubtype="0" fill="hold" grpId="0" nodeType="clickEffect">
+                                  <p:stCondLst>
+                                    <p:cond delay="0"/>
+                                  </p:stCondLst>
+                                  <p:childTnLst>
+                                    <p:set>
+                                      <p:cBhvr>
+                                        <p:cTn id="14" dur="1" fill="hold">
+                                          <p:stCondLst>
+                                            <p:cond delay="0"/>
+                                          </p:stCondLst>
+                                        </p:cTn>
+                                        <p:tgtEl>
+                                          <p:spTgt spid="8"/>
+                                        </p:tgtEl>
+                                        <p:attrNameLst>
+                                          <p:attrName>style.visibility</p:attrName>
+                                        </p:attrNameLst>
+                                      </p:cBhvr>
+                                      <p:to>
+                                        <p:strVal val="visible"/>
+                                      </p:to>
+                                    </p:set>
+                                  </p:childTnLst>
+                                </p:cTn>
+                              </p:par>
+                            </p:childTnLst>
+                          </p:cTn>
+                        </p:par>
+                      </p:childTnLst>
+                    </p:cTn>
+                  </p:par>
+                  <p:par>
+                    <p:cTn id="15" fill="hold">
+                      <p:stCondLst>
+                        <p:cond delay="indefinite"/>
+                      </p:stCondLst>
+                      <p:childTnLst>
+                        <p:par>
+                          <p:cTn id="16" fill="hold">
+                            <p:stCondLst>
+                              <p:cond delay="0"/>
+                            </p:stCondLst>
+                            <p:childTnLst>
+                              <p:par>
+                                <p:cTn id="17" presetID="1" presetClass="entr" presetSubtype="0" fill="hold" grpId="0" nodeType="clickEffect">
+                                  <p:stCondLst>
+                                    <p:cond delay="0"/>
+                                  </p:stCondLst>
+                                  <p:childTnLst>
+                                    <p:set>
+                                      <p:cBhvr>
+                                        <p:cTn id="18" dur="1" fill="hold">
+                                          <p:stCondLst>
+                                            <p:cond delay="0"/>
+                                          </p:stCondLst>
+                                        </p:cTn>
+                                        <p:tgtEl>
+                                          <p:spTgt spid="9"/>
+                                        </p:tgtEl>
+                                        <p:attrNameLst>
+                                          <p:attrName>style.visibility</p:attrName>
+                                        </p:attrNameLst>
+                                      </p:cBhvr>
+                                      <p:to>
+                                        <p:strVal val="visible"/>
+                                      </p:to>
+                                    </p:set>
+                                  </p:childTnLst>
+                                </p:cTn>
+                              </p:par>
+                            </p:childTnLst>
+                          </p:cTn>
+                        </p:par>
+                      </p:childTnLst>
+                    </p:cTn>
+                  </p:par>
+                </p:childTnLst>
+              </p:cTn>
+              <p:prevCondLst>
+                <p:cond evt="onPrev" delay="0">
+                  <p:tgtEl>
+                    <p:sldTgt/>
+                  </p:tgtEl>
+                </p:cond>
+              </p:prevCondLst>
+              <p:nextCondLst>
+                <p:cond evt="onNext" delay="0">
+                  <p:tgtEl>
+                    <p:sldTgt/>
+                  </p:tgtEl>
+                </p:cond>
+              </p:nextCondLst>
+            </p:seq>
+          </p:childTnLst>
+        </p:cTn>
+      </p:par>
+    </p:tnLst>
+    <p:bldLst>
+      <p:bldP spid="6" grpId="0" animBg="1"/>
+      <p:bldP spid="7" grpId="0" animBg="1"/>
+      <p:bldP spid="8" grpId="0" animBg="1"/>
+      <p:bldP spid="9" grpId="0" animBg="1"/>
+    </p:bldLst>
+  </p:timing>
+</p:sld>
+</file>
+
+<file path=ppt/slides/slide46.xml><?xml version="1.0" encoding="utf-8"?>
+<p:sld xmlns:a="http://schemas.openxmlformats.org/drawingml/2006/main" xmlns:r="http://schemas.openxmlformats.org/officeDocument/2006/relationships" xmlns:p="http://schemas.openxmlformats.org/presentationml/2006/main">
+  <p:cSld>
+    <p:spTree>
+      <p:nvGrpSpPr>
+        <p:cNvPr id="1" name=""/>
+        <p:cNvGrpSpPr/>
+        <p:nvPr/>
+      </p:nvGrpSpPr>
+      <p:grpSpPr>
+        <a:xfrm>
+          <a:off x="0" y="0"/>
+          <a:ext cx="0" cy="0"/>
+          <a:chOff x="0" y="0"/>
+          <a:chExt cx="0" cy="0"/>
+        </a:xfrm>
+      </p:grpSpPr>
+      <p:sp>
+        <p:nvSpPr>
+          <p:cNvPr id="4" name="Slide Number Placeholder 3"/>
+          <p:cNvSpPr>
+            <a:spLocks noGrp="1"/>
+          </p:cNvSpPr>
+          <p:nvPr>
+            <p:ph type="sldNum" sz="quarter" idx="12"/>
+          </p:nvPr>
+        </p:nvSpPr>
+        <p:spPr/>
+        <p:txBody>
+          <a:bodyPr/>
+          <a:lstStyle/>
+          <a:p>
+            <a:fld id="{60E1BFF4-DB76-D940-A65B-72E1BC4F90EC}" type="slidenum">
+              <a:rPr lang="en-US" smtClean="0"/>
+              <a:pPr/>
+              <a:t>46</a:t>
+            </a:fld>
+            <a:endParaRPr lang="en-US"/>
+          </a:p>
+        </p:txBody>
+      </p:sp>
+      <p:sp>
+        <p:nvSpPr>
+          <p:cNvPr id="6" name="TextBox 5"/>
+          <p:cNvSpPr txBox="1"/>
+          <p:nvPr/>
+        </p:nvSpPr>
+        <p:spPr>
+          <a:xfrm>
+            <a:off x="791580" y="309592"/>
+            <a:ext cx="7560840" cy="4524315"/>
+          </a:xfrm>
+          <a:prstGeom prst="rect">
+            <a:avLst/>
+          </a:prstGeom>
+          <a:noFill/>
+        </p:spPr>
+        <p:txBody>
+          <a:bodyPr wrap="square" rtlCol="0">
+            <a:spAutoFit/>
+          </a:bodyPr>
+          <a:lstStyle/>
+          <a:p>
+            <a:r>
+              <a:rPr lang="en-US" sz="1800" dirty="0">
+                <a:latin typeface="Consolas" panose="020B0609020204030204" pitchFamily="49" charset="0"/>
+                <a:cs typeface="Consolas" panose="020B0609020204030204" pitchFamily="49" charset="0"/>
+              </a:rPr>
+              <a:t>#include &lt;</a:t>
+            </a:r>
+            <a:r>
+              <a:rPr lang="en-US" sz="1800" dirty="0" err="1">
+                <a:latin typeface="Consolas" panose="020B0609020204030204" pitchFamily="49" charset="0"/>
+                <a:cs typeface="Consolas" panose="020B0609020204030204" pitchFamily="49" charset="0"/>
+              </a:rPr>
+              <a:t>stdio.h</a:t>
+            </a:r>
+            <a:r>
+              <a:rPr lang="en-US" sz="1800" dirty="0">
+                <a:latin typeface="Consolas" panose="020B0609020204030204" pitchFamily="49" charset="0"/>
+                <a:cs typeface="Consolas" panose="020B0609020204030204" pitchFamily="49" charset="0"/>
+              </a:rPr>
+              <a:t>&gt;</a:t>
+            </a:r>
+          </a:p>
+          <a:p>
+            <a:endParaRPr lang="en-US" sz="1800" dirty="0">
+              <a:latin typeface="Consolas" panose="020B0609020204030204" pitchFamily="49" charset="0"/>
+              <a:cs typeface="Consolas" panose="020B0609020204030204" pitchFamily="49" charset="0"/>
+            </a:endParaRPr>
+          </a:p>
+          <a:p>
+            <a:r>
+              <a:rPr lang="en-US" sz="1800" dirty="0">
+                <a:latin typeface="Consolas" panose="020B0609020204030204" pitchFamily="49" charset="0"/>
+                <a:cs typeface="Consolas" panose="020B0609020204030204" pitchFamily="49" charset="0"/>
+              </a:rPr>
+              <a:t>main () </a:t>
+            </a:r>
+          </a:p>
+          <a:p>
+            <a:r>
+              <a:rPr lang="en-US" sz="1800" dirty="0">
+                <a:latin typeface="Consolas" panose="020B0609020204030204" pitchFamily="49" charset="0"/>
+                <a:cs typeface="Consolas" panose="020B0609020204030204" pitchFamily="49" charset="0"/>
+              </a:rPr>
+              <a:t>{ </a:t>
+            </a:r>
+          </a:p>
+          <a:p>
+            <a:r>
+              <a:rPr lang="en-US" sz="1800" dirty="0">
+                <a:latin typeface="Consolas" panose="020B0609020204030204" pitchFamily="49" charset="0"/>
+                <a:cs typeface="Consolas" panose="020B0609020204030204" pitchFamily="49" charset="0"/>
+              </a:rPr>
+              <a:t>      </a:t>
+            </a:r>
+            <a:r>
+              <a:rPr lang="en-US" sz="1800" dirty="0" err="1">
+                <a:latin typeface="Consolas" panose="020B0609020204030204" pitchFamily="49" charset="0"/>
+                <a:cs typeface="Consolas" panose="020B0609020204030204" pitchFamily="49" charset="0"/>
+              </a:rPr>
+              <a:t>int</a:t>
+            </a:r>
+            <a:r>
+              <a:rPr lang="en-US" sz="1800" dirty="0">
+                <a:latin typeface="Consolas" panose="020B0609020204030204" pitchFamily="49" charset="0"/>
+                <a:cs typeface="Consolas" panose="020B0609020204030204" pitchFamily="49" charset="0"/>
+              </a:rPr>
+              <a:t> </a:t>
+            </a:r>
+            <a:r>
+              <a:rPr lang="en-US" sz="1800" dirty="0" err="1">
+                <a:latin typeface="Consolas" panose="020B0609020204030204" pitchFamily="49" charset="0"/>
+                <a:cs typeface="Consolas" panose="020B0609020204030204" pitchFamily="49" charset="0"/>
+              </a:rPr>
+              <a:t>n</a:t>
+            </a:r>
+            <a:r>
+              <a:rPr lang="en-US" sz="1800" dirty="0">
+                <a:latin typeface="Consolas" panose="020B0609020204030204" pitchFamily="49" charset="0"/>
+                <a:cs typeface="Consolas" panose="020B0609020204030204" pitchFamily="49" charset="0"/>
+              </a:rPr>
+              <a:t> = 10;</a:t>
+            </a:r>
+          </a:p>
+          <a:p>
+            <a:r>
+              <a:rPr lang="en-US" sz="1800" dirty="0">
+                <a:latin typeface="Consolas" panose="020B0609020204030204" pitchFamily="49" charset="0"/>
+                <a:cs typeface="Consolas" panose="020B0609020204030204" pitchFamily="49" charset="0"/>
+              </a:rPr>
+              <a:t>      </a:t>
+            </a:r>
+            <a:r>
+              <a:rPr lang="en-US" sz="1800" dirty="0" err="1">
+                <a:latin typeface="Consolas" panose="020B0609020204030204" pitchFamily="49" charset="0"/>
+                <a:cs typeface="Consolas" panose="020B0609020204030204" pitchFamily="49" charset="0"/>
+              </a:rPr>
+              <a:t>printf("The</a:t>
+            </a:r>
+            <a:r>
+              <a:rPr lang="en-US" sz="1800" dirty="0">
+                <a:latin typeface="Consolas" panose="020B0609020204030204" pitchFamily="49" charset="0"/>
+                <a:cs typeface="Consolas" panose="020B0609020204030204" pitchFamily="49" charset="0"/>
+              </a:rPr>
+              <a:t> factorial of 10 is %</a:t>
+            </a:r>
+            <a:r>
+              <a:rPr lang="en-US" sz="1800" dirty="0" err="1">
+                <a:latin typeface="Consolas" panose="020B0609020204030204" pitchFamily="49" charset="0"/>
+                <a:cs typeface="Consolas" panose="020B0609020204030204" pitchFamily="49" charset="0"/>
+              </a:rPr>
+              <a:t>d\n</a:t>
+            </a:r>
+            <a:r>
+              <a:rPr lang="en-US" sz="1800" dirty="0">
+                <a:latin typeface="Consolas" panose="020B0609020204030204" pitchFamily="49" charset="0"/>
+                <a:cs typeface="Consolas" panose="020B0609020204030204" pitchFamily="49" charset="0"/>
+              </a:rPr>
+              <a:t>", </a:t>
+            </a:r>
+            <a:r>
+              <a:rPr lang="en-US" sz="1800" dirty="0" err="1">
+                <a:latin typeface="Consolas" panose="020B0609020204030204" pitchFamily="49" charset="0"/>
+                <a:cs typeface="Consolas" panose="020B0609020204030204" pitchFamily="49" charset="0"/>
+              </a:rPr>
+              <a:t>fact(n</a:t>
+            </a:r>
+            <a:r>
+              <a:rPr lang="en-US" sz="1800" dirty="0">
+                <a:latin typeface="Consolas" panose="020B0609020204030204" pitchFamily="49" charset="0"/>
+                <a:cs typeface="Consolas" panose="020B0609020204030204" pitchFamily="49" charset="0"/>
+              </a:rPr>
+              <a:t>)); </a:t>
+            </a:r>
+          </a:p>
+          <a:p>
+            <a:r>
+              <a:rPr lang="en-US" sz="1800" dirty="0">
+                <a:latin typeface="Consolas" panose="020B0609020204030204" pitchFamily="49" charset="0"/>
+                <a:cs typeface="Consolas" panose="020B0609020204030204" pitchFamily="49" charset="0"/>
+              </a:rPr>
+              <a:t>} </a:t>
+            </a:r>
+          </a:p>
+          <a:p>
+            <a:endParaRPr lang="en-US" sz="1800" dirty="0">
+              <a:latin typeface="Consolas" panose="020B0609020204030204" pitchFamily="49" charset="0"/>
+              <a:cs typeface="Consolas" panose="020B0609020204030204" pitchFamily="49" charset="0"/>
+            </a:endParaRPr>
+          </a:p>
+          <a:p>
+            <a:r>
+              <a:rPr lang="en-US" sz="1800" dirty="0" err="1">
+                <a:latin typeface="Consolas" panose="020B0609020204030204" pitchFamily="49" charset="0"/>
+                <a:cs typeface="Consolas" panose="020B0609020204030204" pitchFamily="49" charset="0"/>
+              </a:rPr>
+              <a:t>int</a:t>
+            </a:r>
+            <a:r>
+              <a:rPr lang="en-US" sz="1800" dirty="0">
+                <a:latin typeface="Consolas" panose="020B0609020204030204" pitchFamily="49" charset="0"/>
+                <a:cs typeface="Consolas" panose="020B0609020204030204" pitchFamily="49" charset="0"/>
+              </a:rPr>
+              <a:t> fact (</a:t>
+            </a:r>
+            <a:r>
+              <a:rPr lang="en-US" sz="1800" dirty="0" err="1">
+                <a:latin typeface="Consolas" panose="020B0609020204030204" pitchFamily="49" charset="0"/>
+                <a:cs typeface="Consolas" panose="020B0609020204030204" pitchFamily="49" charset="0"/>
+              </a:rPr>
+              <a:t>int</a:t>
+            </a:r>
+            <a:r>
+              <a:rPr lang="en-US" sz="1800" dirty="0">
+                <a:latin typeface="Consolas" panose="020B0609020204030204" pitchFamily="49" charset="0"/>
+                <a:cs typeface="Consolas" panose="020B0609020204030204" pitchFamily="49" charset="0"/>
+              </a:rPr>
+              <a:t> </a:t>
+            </a:r>
+            <a:r>
+              <a:rPr lang="en-US" sz="1800" dirty="0" err="1">
+                <a:latin typeface="Consolas" panose="020B0609020204030204" pitchFamily="49" charset="0"/>
+                <a:cs typeface="Consolas" panose="020B0609020204030204" pitchFamily="49" charset="0"/>
+              </a:rPr>
+              <a:t>n</a:t>
+            </a:r>
+            <a:r>
+              <a:rPr lang="en-US" sz="1800" dirty="0">
+                <a:latin typeface="Consolas" panose="020B0609020204030204" pitchFamily="49" charset="0"/>
+                <a:cs typeface="Consolas" panose="020B0609020204030204" pitchFamily="49" charset="0"/>
+              </a:rPr>
+              <a:t>) </a:t>
+            </a:r>
+          </a:p>
+          <a:p>
+            <a:r>
+              <a:rPr lang="en-US" sz="1800" dirty="0">
+                <a:latin typeface="Consolas" panose="020B0609020204030204" pitchFamily="49" charset="0"/>
+                <a:cs typeface="Consolas" panose="020B0609020204030204" pitchFamily="49" charset="0"/>
+              </a:rPr>
+              <a:t>{ </a:t>
+            </a:r>
+          </a:p>
+          <a:p>
+            <a:r>
+              <a:rPr lang="en-US" sz="1800" dirty="0">
+                <a:latin typeface="Consolas" panose="020B0609020204030204" pitchFamily="49" charset="0"/>
+                <a:cs typeface="Consolas" panose="020B0609020204030204" pitchFamily="49" charset="0"/>
+              </a:rPr>
+              <a:t>      if (</a:t>
+            </a:r>
+            <a:r>
+              <a:rPr lang="en-US" sz="1800" dirty="0" err="1">
+                <a:latin typeface="Consolas" panose="020B0609020204030204" pitchFamily="49" charset="0"/>
+                <a:cs typeface="Consolas" panose="020B0609020204030204" pitchFamily="49" charset="0"/>
+              </a:rPr>
+              <a:t>n</a:t>
+            </a:r>
+            <a:r>
+              <a:rPr lang="en-US" sz="1800" dirty="0">
+                <a:latin typeface="Consolas" panose="020B0609020204030204" pitchFamily="49" charset="0"/>
+                <a:cs typeface="Consolas" panose="020B0609020204030204" pitchFamily="49" charset="0"/>
+              </a:rPr>
+              <a:t> &lt; 1) </a:t>
+            </a:r>
+          </a:p>
+          <a:p>
+            <a:r>
+              <a:rPr lang="en-US" sz="1800" dirty="0">
+                <a:latin typeface="Consolas" panose="020B0609020204030204" pitchFamily="49" charset="0"/>
+                <a:cs typeface="Consolas" panose="020B0609020204030204" pitchFamily="49" charset="0"/>
+              </a:rPr>
+              <a:t>            return(1); </a:t>
+            </a:r>
+          </a:p>
+          <a:p>
+            <a:r>
+              <a:rPr lang="en-US" sz="1800" dirty="0">
+                <a:latin typeface="Consolas" panose="020B0609020204030204" pitchFamily="49" charset="0"/>
+                <a:cs typeface="Consolas" panose="020B0609020204030204" pitchFamily="49" charset="0"/>
+              </a:rPr>
+              <a:t>      else </a:t>
+            </a:r>
+          </a:p>
+          <a:p>
+            <a:r>
+              <a:rPr lang="en-US" sz="1800" dirty="0">
+                <a:latin typeface="Consolas" panose="020B0609020204030204" pitchFamily="49" charset="0"/>
+                <a:cs typeface="Consolas" panose="020B0609020204030204" pitchFamily="49" charset="0"/>
+              </a:rPr>
+              <a:t>            </a:t>
+            </a:r>
+            <a:r>
+              <a:rPr lang="en-US" sz="1800" dirty="0" err="1">
+                <a:latin typeface="Consolas" panose="020B0609020204030204" pitchFamily="49" charset="0"/>
+                <a:cs typeface="Consolas" panose="020B0609020204030204" pitchFamily="49" charset="0"/>
+              </a:rPr>
+              <a:t>return(n</a:t>
+            </a:r>
+            <a:r>
+              <a:rPr lang="en-US" sz="1800" dirty="0">
+                <a:latin typeface="Consolas" panose="020B0609020204030204" pitchFamily="49" charset="0"/>
+                <a:cs typeface="Consolas" panose="020B0609020204030204" pitchFamily="49" charset="0"/>
+              </a:rPr>
+              <a:t> * </a:t>
+            </a:r>
+            <a:r>
+              <a:rPr lang="en-US" sz="1800" dirty="0" err="1">
+                <a:latin typeface="Consolas" panose="020B0609020204030204" pitchFamily="49" charset="0"/>
+                <a:cs typeface="Consolas" panose="020B0609020204030204" pitchFamily="49" charset="0"/>
+              </a:rPr>
+              <a:t>fact(n</a:t>
+            </a:r>
+            <a:r>
+              <a:rPr lang="en-US" sz="1800" dirty="0">
+                <a:latin typeface="Consolas" panose="020B0609020204030204" pitchFamily="49" charset="0"/>
+                <a:cs typeface="Consolas" panose="020B0609020204030204" pitchFamily="49" charset="0"/>
+              </a:rPr>
+              <a:t> - 1)); </a:t>
+            </a:r>
+          </a:p>
+          <a:p>
+            <a:r>
+              <a:rPr lang="en-US" sz="1800" dirty="0">
+                <a:latin typeface="Consolas" panose="020B0609020204030204" pitchFamily="49" charset="0"/>
+                <a:cs typeface="Consolas" panose="020B0609020204030204" pitchFamily="49" charset="0"/>
+              </a:rPr>
+              <a:t>} </a:t>
+            </a:r>
+          </a:p>
+          <a:p>
+            <a:endParaRPr lang="en-US" sz="1800" dirty="0" err="1">
+              <a:latin typeface="Consolas" panose="020B0609020204030204" pitchFamily="49" charset="0"/>
+              <a:cs typeface="Consolas" panose="020B0609020204030204" pitchFamily="49" charset="0"/>
+            </a:endParaRPr>
+          </a:p>
+        </p:txBody>
+      </p:sp>
+    </p:spTree>
+    <p:extLst>
+      <p:ext uri="{BB962C8B-B14F-4D97-AF65-F5344CB8AC3E}">
+        <p14:creationId xmlns:p14="http://schemas.microsoft.com/office/powerpoint/2010/main" val="2254468117"/>
+      </p:ext>
+    </p:extLst>
+  </p:cSld>
+  <p:clrMapOvr>
+    <a:masterClrMapping/>
+  </p:clrMapOvr>
+</p:sld>
+</file>
+
+<file path=ppt/slides/slide47.xml><?xml version="1.0" encoding="utf-8"?>
+<p:sld xmlns:a="http://schemas.openxmlformats.org/drawingml/2006/main" xmlns:r="http://schemas.openxmlformats.org/officeDocument/2006/relationships" xmlns:p="http://schemas.openxmlformats.org/presentationml/2006/main">
+  <p:cSld>
+    <p:spTree>
+      <p:nvGrpSpPr>
+        <p:cNvPr id="1" name=""/>
+        <p:cNvGrpSpPr/>
+        <p:nvPr/>
+      </p:nvGrpSpPr>
+      <p:grpSpPr>
+        <a:xfrm>
+          <a:off x="0" y="0"/>
+          <a:ext cx="0" cy="0"/>
+          <a:chOff x="0" y="0"/>
+          <a:chExt cx="0" cy="0"/>
+        </a:xfrm>
+      </p:grpSpPr>
+      <p:sp>
+        <p:nvSpPr>
+          <p:cNvPr id="4" name="Slide Number Placeholder 3"/>
+          <p:cNvSpPr>
+            <a:spLocks noGrp="1"/>
+          </p:cNvSpPr>
+          <p:nvPr>
+            <p:ph type="sldNum" sz="quarter" idx="12"/>
+          </p:nvPr>
+        </p:nvSpPr>
+        <p:spPr/>
+        <p:txBody>
+          <a:bodyPr/>
+          <a:lstStyle/>
+          <a:p>
+            <a:fld id="{9AC591AD-4D89-CD47-B3D5-BB1C3EB73C69}" type="slidenum">
+              <a:rPr lang="en-US"/>
+              <a:pPr/>
+              <a:t>47</a:t>
+            </a:fld>
+            <a:endParaRPr lang="en-US"/>
+          </a:p>
+        </p:txBody>
+      </p:sp>
+      <p:pic>
+        <p:nvPicPr>
+          <p:cNvPr id="95236" name="Picture 4"/>
+          <p:cNvPicPr>
+            <a:picLocks noChangeAspect="1" noChangeArrowheads="1"/>
+          </p:cNvPicPr>
+          <p:nvPr/>
+        </p:nvPicPr>
+        <p:blipFill>
+          <a:blip r:embed="rId3"/>
+          <a:srcRect/>
+          <a:stretch>
+            <a:fillRect/>
+          </a:stretch>
+        </p:blipFill>
+        <p:spPr bwMode="auto">
+          <a:xfrm>
+            <a:off x="3674994" y="0"/>
+            <a:ext cx="3543300" cy="5143500"/>
+          </a:xfrm>
+          <a:prstGeom prst="rect">
+            <a:avLst/>
+          </a:prstGeom>
+          <a:noFill/>
+          <a:ln w="9525">
+            <a:noFill/>
+            <a:miter lim="800000"/>
+            <a:headEnd/>
+            <a:tailEnd/>
+          </a:ln>
+          <a:effectLst/>
+        </p:spPr>
+      </p:pic>
+      <p:sp>
+        <p:nvSpPr>
+          <p:cNvPr id="2" name="Rounded Rectangular Callout 1"/>
+          <p:cNvSpPr/>
+          <p:nvPr/>
+        </p:nvSpPr>
+        <p:spPr bwMode="auto">
+          <a:xfrm>
+            <a:off x="1385647" y="1851670"/>
+            <a:ext cx="2135345" cy="486906"/>
+          </a:xfrm>
+          <a:prstGeom prst="wedgeRoundRectCallout">
+            <a:avLst>
+              <a:gd name="adj1" fmla="val 64075"/>
+              <a:gd name="adj2" fmla="val -31361"/>
+              <a:gd name="adj3" fmla="val 16667"/>
+            </a:avLst>
+          </a:prstGeom>
+          <a:solidFill>
+            <a:schemeClr val="accent5">
+              <a:lumMod val="40000"/>
+              <a:lumOff val="60000"/>
+            </a:schemeClr>
+          </a:solidFill>
+          <a:ln w="9525" cap="flat" cmpd="sng" algn="ctr">
+            <a:solidFill>
+              <a:schemeClr val="tx1"/>
+            </a:solidFill>
+            <a:prstDash val="solid"/>
+            <a:round/>
+            <a:headEnd type="none" w="med" len="med"/>
+            <a:tailEnd type="none" w="med" len="med"/>
+          </a:ln>
+          <a:effectLst/>
+        </p:spPr>
+        <p:txBody>
+          <a:bodyPr vert="horz" wrap="square" lIns="68580" tIns="34290" rIns="68580" bIns="34290" numCol="1" rtlCol="0" anchor="t" anchorCtr="0" compatLnSpc="1">
+            <a:prstTxWarp prst="textNoShape">
+              <a:avLst/>
+            </a:prstTxWarp>
+          </a:bodyPr>
+          <a:lstStyle/>
+          <a:p>
+            <a:pPr defTabSz="685800"/>
+            <a:r>
+              <a:rPr lang="en-CA" sz="1500" dirty="0">
+                <a:latin typeface="Calibri" panose="020F0502020204030204" pitchFamily="34" charset="0"/>
+              </a:rPr>
+              <a:t>return address in main</a:t>
+            </a:r>
+          </a:p>
+        </p:txBody>
+      </p:sp>
+      <p:sp>
+        <p:nvSpPr>
+          <p:cNvPr id="6" name="Rounded Rectangular Callout 5"/>
+          <p:cNvSpPr/>
+          <p:nvPr/>
+        </p:nvSpPr>
+        <p:spPr bwMode="auto">
+          <a:xfrm>
+            <a:off x="1385647" y="1167594"/>
+            <a:ext cx="2135345" cy="486906"/>
+          </a:xfrm>
+          <a:prstGeom prst="wedgeRoundRectCallout">
+            <a:avLst>
+              <a:gd name="adj1" fmla="val 67086"/>
+              <a:gd name="adj2" fmla="val 45665"/>
+              <a:gd name="adj3" fmla="val 16667"/>
+            </a:avLst>
+          </a:prstGeom>
+          <a:solidFill>
+            <a:schemeClr val="accent5">
+              <a:lumMod val="40000"/>
+              <a:lumOff val="60000"/>
+            </a:schemeClr>
+          </a:solidFill>
+          <a:ln w="9525" cap="flat" cmpd="sng" algn="ctr">
+            <a:solidFill>
+              <a:schemeClr val="tx1"/>
+            </a:solidFill>
+            <a:prstDash val="solid"/>
+            <a:round/>
+            <a:headEnd type="none" w="med" len="med"/>
+            <a:tailEnd type="none" w="med" len="med"/>
+          </a:ln>
+          <a:effectLst/>
+        </p:spPr>
+        <p:txBody>
+          <a:bodyPr vert="horz" wrap="square" lIns="68580" tIns="34290" rIns="68580" bIns="34290" numCol="1" rtlCol="0" anchor="t" anchorCtr="0" compatLnSpc="1">
+            <a:prstTxWarp prst="textNoShape">
+              <a:avLst/>
+            </a:prstTxWarp>
+          </a:bodyPr>
+          <a:lstStyle/>
+          <a:p>
+            <a:pPr defTabSz="685800"/>
+            <a:r>
+              <a:rPr lang="en-CA" sz="1500" dirty="0">
+                <a:latin typeface="Calibri" panose="020F0502020204030204" pitchFamily="34" charset="0"/>
+              </a:rPr>
+              <a:t>$a0(=10) saved in stack</a:t>
+            </a:r>
+          </a:p>
+        </p:txBody>
+      </p:sp>
+    </p:spTree>
+    <p:extLst>
+      <p:ext uri="{BB962C8B-B14F-4D97-AF65-F5344CB8AC3E}">
+        <p14:creationId xmlns:p14="http://schemas.microsoft.com/office/powerpoint/2010/main" val="3921522230"/>
+      </p:ext>
+    </p:extLst>
+  </p:cSld>
+  <p:clrMapOvr>
+    <a:masterClrMapping/>
+  </p:clrMapOvr>
+  <p:timing>
+    <p:tnLst>
+      <p:par>
+        <p:cTn id="1" dur="indefinite" restart="never" nodeType="tmRoot">
+          <p:childTnLst>
+            <p:seq concurrent="1" nextAc="seek">
+              <p:cTn id="2" dur="indefinite" nodeType="mainSeq">
+                <p:childTnLst>
+                  <p:par>
+                    <p:cTn id="3" fill="hold">
+                      <p:stCondLst>
+                        <p:cond delay="indefinite"/>
+                      </p:stCondLst>
+                      <p:childTnLst>
+                        <p:par>
+                          <p:cTn id="4" fill="hold">
+                            <p:stCondLst>
+                              <p:cond delay="0"/>
+                            </p:stCondLst>
+                            <p:childTnLst>
+                              <p:par>
+                                <p:cTn id="5" presetID="1" presetClass="entr" presetSubtype="0" fill="hold" grpId="0" nodeType="clickEffect">
+                                  <p:stCondLst>
+                                    <p:cond delay="0"/>
+                                  </p:stCondLst>
+                                  <p:childTnLst>
+                                    <p:set>
+                                      <p:cBhvr>
+                                        <p:cTn id="6" dur="1" fill="hold">
+                                          <p:stCondLst>
+                                            <p:cond delay="0"/>
+                                          </p:stCondLst>
+                                        </p:cTn>
+                                        <p:tgtEl>
+                                          <p:spTgt spid="2"/>
+                                        </p:tgtEl>
+                                        <p:attrNameLst>
+                                          <p:attrName>style.visibility</p:attrName>
+                                        </p:attrNameLst>
+                                      </p:cBhvr>
+                                      <p:to>
+                                        <p:strVal val="visible"/>
+                                      </p:to>
+                                    </p:set>
+                                  </p:childTnLst>
+                                </p:cTn>
+                              </p:par>
+                            </p:childTnLst>
+                          </p:cTn>
+                        </p:par>
+                      </p:childTnLst>
+                    </p:cTn>
+                  </p:par>
+                  <p:par>
+                    <p:cTn id="7" fill="hold">
+                      <p:stCondLst>
+                        <p:cond delay="indefinite"/>
+                      </p:stCondLst>
+                      <p:childTnLst>
+                        <p:par>
+                          <p:cTn id="8" fill="hold">
+                            <p:stCondLst>
+                              <p:cond delay="0"/>
+                            </p:stCondLst>
+                            <p:childTnLst>
+                              <p:par>
+                                <p:cTn id="9" presetID="1" presetClass="entr" presetSubtype="0" fill="hold" grpId="0" nodeType="clickEffect">
+                                  <p:stCondLst>
+                                    <p:cond delay="0"/>
+                                  </p:stCondLst>
+                                  <p:childTnLst>
+                                    <p:set>
+                                      <p:cBhvr>
+                                        <p:cTn id="10" dur="1" fill="hold">
+                                          <p:stCondLst>
+                                            <p:cond delay="0"/>
+                                          </p:stCondLst>
+                                        </p:cTn>
+                                        <p:tgtEl>
+                                          <p:spTgt spid="6"/>
+                                        </p:tgtEl>
+                                        <p:attrNameLst>
+                                          <p:attrName>style.visibility</p:attrName>
+                                        </p:attrNameLst>
+                                      </p:cBhvr>
+                                      <p:to>
+                                        <p:strVal val="visible"/>
+                                      </p:to>
+                                    </p:set>
+                                  </p:childTnLst>
+                                </p:cTn>
+                              </p:par>
+                            </p:childTnLst>
+                          </p:cTn>
+                        </p:par>
+                      </p:childTnLst>
+                    </p:cTn>
+                  </p:par>
+                </p:childTnLst>
+              </p:cTn>
+              <p:prevCondLst>
+                <p:cond evt="onPrev" delay="0">
+                  <p:tgtEl>
+                    <p:sldTgt/>
+                  </p:tgtEl>
+                </p:cond>
+              </p:prevCondLst>
+              <p:nextCondLst>
+                <p:cond evt="onNext" delay="0">
+                  <p:tgtEl>
+                    <p:sldTgt/>
+                  </p:tgtEl>
+                </p:cond>
+              </p:nextCondLst>
+            </p:seq>
+          </p:childTnLst>
+        </p:cTn>
+      </p:par>
+    </p:tnLst>
+    <p:bldLst>
+      <p:bldP spid="2" grpId="0" animBg="1"/>
+      <p:bldP spid="6" grpId="0" animBg="1"/>
+    </p:bldLst>
+  </p:timing>
+</p:sld>
+</file>
+
 <file path=ppt/slides/slide48.xml><?xml version="1.0" encoding="utf-8"?>
 <p:sld xmlns:a="http://schemas.openxmlformats.org/drawingml/2006/main" xmlns:r="http://schemas.openxmlformats.org/officeDocument/2006/relationships" xmlns:p="http://schemas.openxmlformats.org/presentationml/2006/main">
   <p:cSld>
@@ -34197,8 +34199,8 @@
           <a:lstStyle/>
           <a:p>
             <a:r>
-              <a:rPr lang="en-US"/>
-              <a:t>Run-time Memory</a:t>
+              <a:rPr lang="en-US" dirty="0"/>
+              <a:t>MIPS Run-time Memory</a:t>
             </a:r>
           </a:p>
         </p:txBody>
@@ -34301,8 +34303,8 @@
           <a:lstStyle/>
           <a:p>
             <a:r>
-              <a:rPr lang="en-US"/>
-              <a:t>Stack frame</a:t>
+              <a:rPr lang="en-US" dirty="0"/>
+              <a:t>MIPS Stack frame</a:t>
             </a:r>
           </a:p>
         </p:txBody>
@@ -34667,8 +34669,8 @@
           <a:lstStyle/>
           <a:p>
             <a:r>
-              <a:rPr lang="en-US"/>
-              <a:t>Example: MIPS stack frame</a:t>
+              <a:rPr lang="en-US" dirty="0"/>
+              <a:t>MIPS stack frame</a:t>
             </a:r>
           </a:p>
         </p:txBody>

</xml_diff>

<commit_message>
sem1 and runtime lecture notes and videos
</commit_message>
<xml_diff>
--- a/assets/ppt/codegen/runtime.pptx
+++ b/assets/ppt/codegen/runtime.pptx
@@ -2574,7 +2574,7 @@
           <a:p>
             <a:fld id="{37508BEE-B66E-5E46-B50F-23B30D56323F}" type="datetime1">
               <a:rPr lang="en-CA" smtClean="0"/>
-              <a:t>2020-10-24</a:t>
+              <a:t>2020-10-25</a:t>
             </a:fld>
             <a:endParaRPr lang="en-US"/>
           </a:p>
@@ -2772,7 +2772,7 @@
           <a:p>
             <a:fld id="{94ED5F46-E862-7041-B839-1084A839C514}" type="datetime1">
               <a:rPr lang="en-CA" smtClean="0"/>
-              <a:t>2020-10-24</a:t>
+              <a:t>2020-10-25</a:t>
             </a:fld>
             <a:endParaRPr lang="en-US"/>
           </a:p>
@@ -2980,7 +2980,7 @@
           <a:p>
             <a:fld id="{A0755934-2EEA-454B-B47B-39481B16D93C}" type="datetime1">
               <a:rPr lang="en-CA" smtClean="0"/>
-              <a:t>2020-10-24</a:t>
+              <a:t>2020-10-25</a:t>
             </a:fld>
             <a:endParaRPr lang="en-US"/>
           </a:p>
@@ -4043,7 +4043,7 @@
           <a:p>
             <a:fld id="{33CDF6D5-475A-F046-87CA-412EB71D7141}" type="datetime1">
               <a:rPr lang="en-CA" smtClean="0"/>
-              <a:t>2020-10-24</a:t>
+              <a:t>2020-10-25</a:t>
             </a:fld>
             <a:endParaRPr/>
           </a:p>
@@ -4459,7 +4459,7 @@
           <a:p>
             <a:fld id="{BD806BE7-D4FF-0747-A46D-9D28D6793F9A}" type="datetime1">
               <a:rPr lang="en-CA" smtClean="0"/>
-              <a:t>2020-10-24</a:t>
+              <a:t>2020-10-25</a:t>
             </a:fld>
             <a:endParaRPr lang="en-US"/>
           </a:p>
@@ -4734,7 +4734,7 @@
           <a:p>
             <a:fld id="{FC112D8A-ADE8-E648-9A51-673455F77FA4}" type="datetime1">
               <a:rPr lang="en-CA" smtClean="0"/>
-              <a:t>2020-10-24</a:t>
+              <a:t>2020-10-25</a:t>
             </a:fld>
             <a:endParaRPr lang="en-US"/>
           </a:p>
@@ -4999,7 +4999,7 @@
           <a:p>
             <a:fld id="{A1C4D21D-FE66-404B-9D48-8813A41FDE83}" type="datetime1">
               <a:rPr lang="en-CA" smtClean="0"/>
-              <a:t>2020-10-24</a:t>
+              <a:t>2020-10-25</a:t>
             </a:fld>
             <a:endParaRPr lang="en-US"/>
           </a:p>
@@ -5411,7 +5411,7 @@
           <a:p>
             <a:fld id="{BC43913A-9187-9E4F-99AD-E5F9D3D715A1}" type="datetime1">
               <a:rPr lang="en-CA" smtClean="0"/>
-              <a:t>2020-10-24</a:t>
+              <a:t>2020-10-25</a:t>
             </a:fld>
             <a:endParaRPr lang="en-US"/>
           </a:p>
@@ -5552,7 +5552,7 @@
           <a:p>
             <a:fld id="{D640FCF0-750B-2849-A907-F64332DB8FEE}" type="datetime1">
               <a:rPr lang="en-CA" smtClean="0"/>
-              <a:t>2020-10-24</a:t>
+              <a:t>2020-10-25</a:t>
             </a:fld>
             <a:endParaRPr lang="en-US"/>
           </a:p>
@@ -5665,7 +5665,7 @@
           <a:p>
             <a:fld id="{C84DF663-3970-9B45-8274-AA8FABDA274B}" type="datetime1">
               <a:rPr lang="en-CA" smtClean="0"/>
-              <a:t>2020-10-24</a:t>
+              <a:t>2020-10-25</a:t>
             </a:fld>
             <a:endParaRPr lang="en-US"/>
           </a:p>
@@ -5976,7 +5976,7 @@
           <a:p>
             <a:fld id="{2EE809A3-0E53-524E-A233-B12C5DA91D99}" type="datetime1">
               <a:rPr lang="en-CA" smtClean="0"/>
-              <a:t>2020-10-24</a:t>
+              <a:t>2020-10-25</a:t>
             </a:fld>
             <a:endParaRPr lang="en-US"/>
           </a:p>
@@ -6264,7 +6264,7 @@
           <a:p>
             <a:fld id="{CBAFDF68-DD51-514E-B179-E22080947065}" type="datetime1">
               <a:rPr lang="en-CA" smtClean="0"/>
-              <a:t>2020-10-24</a:t>
+              <a:t>2020-10-25</a:t>
             </a:fld>
             <a:endParaRPr lang="en-US"/>
           </a:p>
@@ -6506,7 +6506,7 @@
           <a:p>
             <a:fld id="{CFB5B512-1C0B-5F4A-B1D8-07EED328189A}" type="datetime1">
               <a:rPr lang="en-CA" smtClean="0"/>
-              <a:t>2020-10-24</a:t>
+              <a:t>2020-10-25</a:t>
             </a:fld>
             <a:endParaRPr lang="en-US" dirty="0"/>
           </a:p>
@@ -6940,10 +6940,6 @@
           </p:nvPr>
         </p:nvSpPr>
         <p:spPr>
-          <a:xfrm>
-            <a:off x="1376781" y="781437"/>
-            <a:ext cx="6390450" cy="2052675"/>
-          </a:xfrm>
           <a:prstGeom prst="rect">
             <a:avLst/>
           </a:prstGeom>
@@ -6992,10 +6988,6 @@
           </p:nvPr>
         </p:nvSpPr>
         <p:spPr>
-          <a:xfrm>
-            <a:off x="1376775" y="2834114"/>
-            <a:ext cx="6390450" cy="1300500"/>
-          </a:xfrm>
           <a:prstGeom prst="rect">
             <a:avLst/>
           </a:prstGeom>
@@ -26584,16 +26576,6 @@
               <a:buNone/>
             </a:pPr>
             <a:r>
-              <a:rPr lang="en-CA" dirty="0" err="1">
-                <a:solidFill>
-                  <a:schemeClr val="accent2"/>
-                </a:solidFill>
-                <a:latin typeface="Consolas" panose="020B0609020204030204" pitchFamily="49" charset="0"/>
-                <a:cs typeface="Consolas" panose="020B0609020204030204" pitchFamily="49" charset="0"/>
-              </a:rPr>
-              <a:t>int</a:t>
-            </a:r>
-            <a:r>
               <a:rPr lang="en-CA" dirty="0">
                 <a:solidFill>
                   <a:schemeClr val="accent2"/>
@@ -26601,47 +26583,7 @@
                 <a:latin typeface="Consolas" panose="020B0609020204030204" pitchFamily="49" charset="0"/>
                 <a:cs typeface="Consolas" panose="020B0609020204030204" pitchFamily="49" charset="0"/>
               </a:rPr>
-              <a:t>* foo() {</a:t>
-            </a:r>
-            <a:r>
-              <a:rPr lang="en-CA" dirty="0" err="1">
-                <a:solidFill>
-                  <a:schemeClr val="accent2"/>
-                </a:solidFill>
-                <a:latin typeface="Consolas" panose="020B0609020204030204" pitchFamily="49" charset="0"/>
-                <a:cs typeface="Consolas" panose="020B0609020204030204" pitchFamily="49" charset="0"/>
-              </a:rPr>
-              <a:t>int</a:t>
-            </a:r>
-            <a:r>
-              <a:rPr lang="en-CA" dirty="0">
-                <a:solidFill>
-                  <a:schemeClr val="accent2"/>
-                </a:solidFill>
-                <a:latin typeface="Consolas" panose="020B0609020204030204" pitchFamily="49" charset="0"/>
-                <a:cs typeface="Consolas" panose="020B0609020204030204" pitchFamily="49" charset="0"/>
-              </a:rPr>
-              <a:t> * bar = new </a:t>
-            </a:r>
-            <a:r>
-              <a:rPr lang="en-CA" dirty="0" err="1">
-                <a:solidFill>
-                  <a:schemeClr val="accent2"/>
-                </a:solidFill>
-                <a:latin typeface="Consolas" panose="020B0609020204030204" pitchFamily="49" charset="0"/>
-                <a:cs typeface="Consolas" panose="020B0609020204030204" pitchFamily="49" charset="0"/>
-              </a:rPr>
-              <a:t>int</a:t>
-            </a:r>
-            <a:r>
-              <a:rPr lang="en-CA" dirty="0">
-                <a:solidFill>
-                  <a:schemeClr val="accent2"/>
-                </a:solidFill>
-                <a:latin typeface="Consolas" panose="020B0609020204030204" pitchFamily="49" charset="0"/>
-                <a:cs typeface="Consolas" panose="020B0609020204030204" pitchFamily="49" charset="0"/>
-              </a:rPr>
-              <a:t>[size]; return bar;}</a:t>
+              <a:t>int* foo() {int *bar = new int[size]; return bar;}</a:t>
             </a:r>
           </a:p>
           <a:p>
@@ -26795,7 +26737,7 @@
           <a:p>
             <a:r>
               <a:rPr lang="en-CA" sz="2100" dirty="0"/>
-              <a:t>The stack contains and AR for each currently active procedure </a:t>
+              <a:t>The stack contains a frame for each currently active procedure </a:t>
             </a:r>
           </a:p>
           <a:p>
@@ -26806,7 +26748,7 @@
                   <a:schemeClr val="accent2"/>
                 </a:solidFill>
               </a:rPr>
-              <a:t>Each AR usually fixed size, contains locals</a:t>
+              <a:t>Each frame usually has a variable size, contains all locals</a:t>
             </a:r>
           </a:p>
           <a:p>
@@ -28476,7 +28418,7 @@
           <a:p>
             <a:r>
               <a:rPr lang="en-CA" dirty="0"/>
-              <a:t>Most modern machines are 32 or 64 bit</a:t>
+              <a:t>Most modern machines are 64 bit</a:t>
             </a:r>
           </a:p>
           <a:p>
@@ -28521,14 +28463,14 @@
           <a:p>
             <a:r>
               <a:rPr lang="en-CA" dirty="0"/>
-              <a:t>Most machines have  some alignment restrictions</a:t>
+              <a:t>Most machines have alignment restrictions</a:t>
             </a:r>
           </a:p>
           <a:p>
             <a:pPr lvl="1"/>
             <a:r>
               <a:rPr lang="en-CA" dirty="0"/>
-              <a:t>Or performance penalties for poor alignment</a:t>
+              <a:t>Severe performance penalties for poor alignment</a:t>
             </a:r>
           </a:p>
         </p:txBody>
@@ -29661,7 +29603,7 @@
           <a:p>
             <a:r>
               <a:rPr lang="en-US" sz="2100" dirty="0"/>
-              <a:t>Functional PLs use heap allocation</a:t>
+              <a:t>Functional programming languages use heap allocation</a:t>
             </a:r>
           </a:p>
         </p:txBody>
@@ -37806,7 +37748,15 @@
             </a:r>
             <a:r>
               <a:rPr lang="en-CA" sz="2400" i="1" dirty="0"/>
-              <a:t> of </a:t>
+              <a:t> </a:t>
+            </a:r>
+            <a:r>
+              <a:rPr lang="en-CA" sz="2400" dirty="0"/>
+              <a:t>of</a:t>
+            </a:r>
+            <a:r>
+              <a:rPr lang="en-CA" sz="2400" i="1" dirty="0"/>
+              <a:t> </a:t>
             </a:r>
             <a:r>
               <a:rPr lang="en-CA" sz="2400" i="1" dirty="0">
@@ -38017,22 +37967,38 @@
           </a:p>
           <a:p>
             <a:r>
-              <a:rPr lang="en-CA" sz="2400" dirty="0"/>
-              <a:t>Note that</a:t>
-            </a:r>
-          </a:p>
-          <a:p>
-            <a:pPr lvl="1"/>
-            <a:r>
-              <a:rPr lang="en-CA" sz="2000" dirty="0"/>
-              <a:t>Lifetime is a dynamic (run-time) concept</a:t>
-            </a:r>
-          </a:p>
-          <a:p>
-            <a:pPr lvl="1"/>
-            <a:r>
-              <a:rPr lang="en-CA" sz="2000" dirty="0"/>
-              <a:t>Scope is a static concept</a:t>
+              <a:rPr lang="en-CA" sz="2300" dirty="0"/>
+              <a:t>Lifetime is a </a:t>
+            </a:r>
+            <a:r>
+              <a:rPr lang="en-CA" sz="2300" dirty="0">
+                <a:solidFill>
+                  <a:srgbClr val="C00000"/>
+                </a:solidFill>
+              </a:rPr>
+              <a:t>dynamic</a:t>
+            </a:r>
+            <a:r>
+              <a:rPr lang="en-CA" sz="2300" dirty="0"/>
+              <a:t> (run-time) concept</a:t>
+            </a:r>
+          </a:p>
+          <a:p>
+            <a:r>
+              <a:rPr lang="en-CA" sz="2300" dirty="0"/>
+              <a:t>Scope is a </a:t>
+            </a:r>
+            <a:r>
+              <a:rPr lang="en-CA" sz="2300" dirty="0">
+                <a:solidFill>
+                  <a:srgbClr val="C00000"/>
+                </a:solidFill>
+              </a:rPr>
+              <a:t>static</a:t>
+            </a:r>
+            <a:r>
+              <a:rPr lang="en-CA" sz="2300" dirty="0"/>
+              <a:t> concept</a:t>
             </a:r>
           </a:p>
         </p:txBody>
@@ -38130,13 +38096,6 @@
           </a:bodyPr>
           <a:lstStyle/>
           <a:p>
-            <a:r>
-              <a:rPr lang="en-CA" sz="2400" dirty="0"/>
-              <a:t>Observation</a:t>
-            </a:r>
-          </a:p>
-          <a:p>
-            <a:pPr lvl="1"/>
             <a:r>
               <a:rPr lang="en-CA" sz="2400" dirty="0"/>
               <a:t>When </a:t>

</xml_diff>